<commit_message>
feat(presentation): working on summary
</commit_message>
<xml_diff>
--- a/Présentation.pptx
+++ b/Présentation.pptx
@@ -4,9 +4,25 @@
   <p:sldMasterIdLst>
     <p:sldMasterId id="2147483660" r:id="rId1"/>
   </p:sldMasterIdLst>
+  <p:notesMasterIdLst>
+    <p:notesMasterId r:id="rId17"/>
+  </p:notesMasterIdLst>
   <p:sldIdLst>
     <p:sldId id="256" r:id="rId2"/>
-    <p:sldId id="257" r:id="rId3"/>
+    <p:sldId id="280" r:id="rId3"/>
+    <p:sldId id="279" r:id="rId4"/>
+    <p:sldId id="257" r:id="rId5"/>
+    <p:sldId id="268" r:id="rId6"/>
+    <p:sldId id="258" r:id="rId7"/>
+    <p:sldId id="259" r:id="rId8"/>
+    <p:sldId id="260" r:id="rId9"/>
+    <p:sldId id="261" r:id="rId10"/>
+    <p:sldId id="262" r:id="rId11"/>
+    <p:sldId id="263" r:id="rId12"/>
+    <p:sldId id="264" r:id="rId13"/>
+    <p:sldId id="265" r:id="rId14"/>
+    <p:sldId id="267" r:id="rId15"/>
+    <p:sldId id="278" r:id="rId16"/>
   </p:sldIdLst>
   <p:sldSz cx="9144000" cy="6858000" type="screen4x3"/>
   <p:notesSz cx="6858000" cy="9144000"/>
@@ -124,6 +140,1599 @@
 </p:presentation>
 </file>
 
+<file path=ppt/notesMasters/notesMaster1.xml><?xml version="1.0" encoding="utf-8"?>
+<p:notesMaster xmlns:a="http://schemas.openxmlformats.org/drawingml/2006/main" xmlns:r="http://schemas.openxmlformats.org/officeDocument/2006/relationships" xmlns:p="http://schemas.openxmlformats.org/presentationml/2006/main">
+  <p:cSld>
+    <p:bg>
+      <p:bgRef idx="1001">
+        <a:schemeClr val="bg1"/>
+      </p:bgRef>
+    </p:bg>
+    <p:spTree>
+      <p:nvGrpSpPr>
+        <p:cNvPr id="1" name=""/>
+        <p:cNvGrpSpPr/>
+        <p:nvPr/>
+      </p:nvGrpSpPr>
+      <p:grpSpPr>
+        <a:xfrm>
+          <a:off x="0" y="0"/>
+          <a:ext cx="0" cy="0"/>
+          <a:chOff x="0" y="0"/>
+          <a:chExt cx="0" cy="0"/>
+        </a:xfrm>
+      </p:grpSpPr>
+      <p:sp>
+        <p:nvSpPr>
+          <p:cNvPr id="2" name="Espace réservé de l'en-tête 1"/>
+          <p:cNvSpPr>
+            <a:spLocks noGrp="1"/>
+          </p:cNvSpPr>
+          <p:nvPr>
+            <p:ph type="hdr" sz="quarter"/>
+          </p:nvPr>
+        </p:nvSpPr>
+        <p:spPr>
+          <a:xfrm>
+            <a:off x="0" y="0"/>
+            <a:ext cx="2971800" cy="458788"/>
+          </a:xfrm>
+          <a:prstGeom prst="rect">
+            <a:avLst/>
+          </a:prstGeom>
+        </p:spPr>
+        <p:txBody>
+          <a:bodyPr vert="horz" lIns="91440" tIns="45720" rIns="91440" bIns="45720" rtlCol="0"/>
+          <a:lstStyle>
+            <a:lvl1pPr algn="l">
+              <a:defRPr sz="1200"/>
+            </a:lvl1pPr>
+          </a:lstStyle>
+          <a:p>
+            <a:endParaRPr lang="fr-FR"/>
+          </a:p>
+        </p:txBody>
+      </p:sp>
+      <p:sp>
+        <p:nvSpPr>
+          <p:cNvPr id="3" name="Espace réservé de la date 2"/>
+          <p:cNvSpPr>
+            <a:spLocks noGrp="1"/>
+          </p:cNvSpPr>
+          <p:nvPr>
+            <p:ph type="dt" idx="1"/>
+          </p:nvPr>
+        </p:nvSpPr>
+        <p:spPr>
+          <a:xfrm>
+            <a:off x="3884613" y="0"/>
+            <a:ext cx="2971800" cy="458788"/>
+          </a:xfrm>
+          <a:prstGeom prst="rect">
+            <a:avLst/>
+          </a:prstGeom>
+        </p:spPr>
+        <p:txBody>
+          <a:bodyPr vert="horz" lIns="91440" tIns="45720" rIns="91440" bIns="45720" rtlCol="0"/>
+          <a:lstStyle>
+            <a:lvl1pPr algn="r">
+              <a:defRPr sz="1200"/>
+            </a:lvl1pPr>
+          </a:lstStyle>
+          <a:p>
+            <a:fld id="{C19E9C8B-E0B4-444C-BE65-75953A2775B7}" type="datetimeFigureOut">
+              <a:rPr lang="fr-FR" smtClean="0"/>
+              <a:t>13/06/2018</a:t>
+            </a:fld>
+            <a:endParaRPr lang="fr-FR"/>
+          </a:p>
+        </p:txBody>
+      </p:sp>
+      <p:sp>
+        <p:nvSpPr>
+          <p:cNvPr id="4" name="Espace réservé de l'image des diapositives 3"/>
+          <p:cNvSpPr>
+            <a:spLocks noGrp="1" noRot="1" noChangeAspect="1"/>
+          </p:cNvSpPr>
+          <p:nvPr>
+            <p:ph type="sldImg" idx="2"/>
+          </p:nvPr>
+        </p:nvSpPr>
+        <p:spPr>
+          <a:xfrm>
+            <a:off x="1371600" y="1143000"/>
+            <a:ext cx="4114800" cy="3086100"/>
+          </a:xfrm>
+          <a:prstGeom prst="rect">
+            <a:avLst/>
+          </a:prstGeom>
+          <a:noFill/>
+          <a:ln w="12700">
+            <a:solidFill>
+              <a:prstClr val="black"/>
+            </a:solidFill>
+          </a:ln>
+        </p:spPr>
+        <p:txBody>
+          <a:bodyPr vert="horz" lIns="91440" tIns="45720" rIns="91440" bIns="45720" rtlCol="0" anchor="ctr"/>
+          <a:lstStyle/>
+          <a:p>
+            <a:endParaRPr lang="fr-FR"/>
+          </a:p>
+        </p:txBody>
+      </p:sp>
+      <p:sp>
+        <p:nvSpPr>
+          <p:cNvPr id="5" name="Espace réservé des notes 4"/>
+          <p:cNvSpPr>
+            <a:spLocks noGrp="1"/>
+          </p:cNvSpPr>
+          <p:nvPr>
+            <p:ph type="body" sz="quarter" idx="3"/>
+          </p:nvPr>
+        </p:nvSpPr>
+        <p:spPr>
+          <a:xfrm>
+            <a:off x="685800" y="4400550"/>
+            <a:ext cx="5486400" cy="3600450"/>
+          </a:xfrm>
+          <a:prstGeom prst="rect">
+            <a:avLst/>
+          </a:prstGeom>
+        </p:spPr>
+        <p:txBody>
+          <a:bodyPr vert="horz" lIns="91440" tIns="45720" rIns="91440" bIns="45720" rtlCol="0"/>
+          <a:lstStyle/>
+          <a:p>
+            <a:r>
+              <a:rPr lang="fr-FR"/>
+              <a:t>Modifier les styles du texte du masque
+Deuxième niveau
+Troisième niveau
+Quatrième niveau
+Cinquième niveau</a:t>
+            </a:r>
+          </a:p>
+        </p:txBody>
+      </p:sp>
+      <p:sp>
+        <p:nvSpPr>
+          <p:cNvPr id="6" name="Espace réservé du pied de page 5"/>
+          <p:cNvSpPr>
+            <a:spLocks noGrp="1"/>
+          </p:cNvSpPr>
+          <p:nvPr>
+            <p:ph type="ftr" sz="quarter" idx="4"/>
+          </p:nvPr>
+        </p:nvSpPr>
+        <p:spPr>
+          <a:xfrm>
+            <a:off x="0" y="8685213"/>
+            <a:ext cx="2971800" cy="458787"/>
+          </a:xfrm>
+          <a:prstGeom prst="rect">
+            <a:avLst/>
+          </a:prstGeom>
+        </p:spPr>
+        <p:txBody>
+          <a:bodyPr vert="horz" lIns="91440" tIns="45720" rIns="91440" bIns="45720" rtlCol="0" anchor="b"/>
+          <a:lstStyle>
+            <a:lvl1pPr algn="l">
+              <a:defRPr sz="1200"/>
+            </a:lvl1pPr>
+          </a:lstStyle>
+          <a:p>
+            <a:endParaRPr lang="fr-FR"/>
+          </a:p>
+        </p:txBody>
+      </p:sp>
+      <p:sp>
+        <p:nvSpPr>
+          <p:cNvPr id="7" name="Espace réservé du numéro de diapositive 6"/>
+          <p:cNvSpPr>
+            <a:spLocks noGrp="1"/>
+          </p:cNvSpPr>
+          <p:nvPr>
+            <p:ph type="sldNum" sz="quarter" idx="5"/>
+          </p:nvPr>
+        </p:nvSpPr>
+        <p:spPr>
+          <a:xfrm>
+            <a:off x="3884613" y="8685213"/>
+            <a:ext cx="2971800" cy="458787"/>
+          </a:xfrm>
+          <a:prstGeom prst="rect">
+            <a:avLst/>
+          </a:prstGeom>
+        </p:spPr>
+        <p:txBody>
+          <a:bodyPr vert="horz" lIns="91440" tIns="45720" rIns="91440" bIns="45720" rtlCol="0" anchor="b"/>
+          <a:lstStyle>
+            <a:lvl1pPr algn="r">
+              <a:defRPr sz="1200"/>
+            </a:lvl1pPr>
+          </a:lstStyle>
+          <a:p>
+            <a:fld id="{AAD9F55B-02C3-7443-8831-E227F1AFC2AA}" type="slidenum">
+              <a:rPr lang="fr-FR" smtClean="0"/>
+              <a:t>‹N°›</a:t>
+            </a:fld>
+            <a:endParaRPr lang="fr-FR"/>
+          </a:p>
+        </p:txBody>
+      </p:sp>
+    </p:spTree>
+    <p:extLst>
+      <p:ext uri="{BB962C8B-B14F-4D97-AF65-F5344CB8AC3E}">
+        <p14:creationId xmlns:p14="http://schemas.microsoft.com/office/powerpoint/2010/main" val="4227774086"/>
+      </p:ext>
+    </p:extLst>
+  </p:cSld>
+  <p:clrMap bg1="lt1" tx1="dk1" bg2="lt2" tx2="dk2" accent1="accent1" accent2="accent2" accent3="accent3" accent4="accent4" accent5="accent5" accent6="accent6" hlink="hlink" folHlink="folHlink"/>
+  <p:notesStyle>
+    <a:lvl1pPr marL="0" algn="l" defTabSz="914400" rtl="0" eaLnBrk="1" latinLnBrk="0" hangingPunct="1">
+      <a:defRPr sz="1200" kern="1200">
+        <a:solidFill>
+          <a:schemeClr val="tx1"/>
+        </a:solidFill>
+        <a:latin typeface="+mn-lt"/>
+        <a:ea typeface="+mn-ea"/>
+        <a:cs typeface="+mn-cs"/>
+      </a:defRPr>
+    </a:lvl1pPr>
+    <a:lvl2pPr marL="457200" algn="l" defTabSz="914400" rtl="0" eaLnBrk="1" latinLnBrk="0" hangingPunct="1">
+      <a:defRPr sz="1200" kern="1200">
+        <a:solidFill>
+          <a:schemeClr val="tx1"/>
+        </a:solidFill>
+        <a:latin typeface="+mn-lt"/>
+        <a:ea typeface="+mn-ea"/>
+        <a:cs typeface="+mn-cs"/>
+      </a:defRPr>
+    </a:lvl2pPr>
+    <a:lvl3pPr marL="914400" algn="l" defTabSz="914400" rtl="0" eaLnBrk="1" latinLnBrk="0" hangingPunct="1">
+      <a:defRPr sz="1200" kern="1200">
+        <a:solidFill>
+          <a:schemeClr val="tx1"/>
+        </a:solidFill>
+        <a:latin typeface="+mn-lt"/>
+        <a:ea typeface="+mn-ea"/>
+        <a:cs typeface="+mn-cs"/>
+      </a:defRPr>
+    </a:lvl3pPr>
+    <a:lvl4pPr marL="1371600" algn="l" defTabSz="914400" rtl="0" eaLnBrk="1" latinLnBrk="0" hangingPunct="1">
+      <a:defRPr sz="1200" kern="1200">
+        <a:solidFill>
+          <a:schemeClr val="tx1"/>
+        </a:solidFill>
+        <a:latin typeface="+mn-lt"/>
+        <a:ea typeface="+mn-ea"/>
+        <a:cs typeface="+mn-cs"/>
+      </a:defRPr>
+    </a:lvl4pPr>
+    <a:lvl5pPr marL="1828800" algn="l" defTabSz="914400" rtl="0" eaLnBrk="1" latinLnBrk="0" hangingPunct="1">
+      <a:defRPr sz="1200" kern="1200">
+        <a:solidFill>
+          <a:schemeClr val="tx1"/>
+        </a:solidFill>
+        <a:latin typeface="+mn-lt"/>
+        <a:ea typeface="+mn-ea"/>
+        <a:cs typeface="+mn-cs"/>
+      </a:defRPr>
+    </a:lvl5pPr>
+    <a:lvl6pPr marL="2286000" algn="l" defTabSz="914400" rtl="0" eaLnBrk="1" latinLnBrk="0" hangingPunct="1">
+      <a:defRPr sz="1200" kern="1200">
+        <a:solidFill>
+          <a:schemeClr val="tx1"/>
+        </a:solidFill>
+        <a:latin typeface="+mn-lt"/>
+        <a:ea typeface="+mn-ea"/>
+        <a:cs typeface="+mn-cs"/>
+      </a:defRPr>
+    </a:lvl6pPr>
+    <a:lvl7pPr marL="2743200" algn="l" defTabSz="914400" rtl="0" eaLnBrk="1" latinLnBrk="0" hangingPunct="1">
+      <a:defRPr sz="1200" kern="1200">
+        <a:solidFill>
+          <a:schemeClr val="tx1"/>
+        </a:solidFill>
+        <a:latin typeface="+mn-lt"/>
+        <a:ea typeface="+mn-ea"/>
+        <a:cs typeface="+mn-cs"/>
+      </a:defRPr>
+    </a:lvl7pPr>
+    <a:lvl8pPr marL="3200400" algn="l" defTabSz="914400" rtl="0" eaLnBrk="1" latinLnBrk="0" hangingPunct="1">
+      <a:defRPr sz="1200" kern="1200">
+        <a:solidFill>
+          <a:schemeClr val="tx1"/>
+        </a:solidFill>
+        <a:latin typeface="+mn-lt"/>
+        <a:ea typeface="+mn-ea"/>
+        <a:cs typeface="+mn-cs"/>
+      </a:defRPr>
+    </a:lvl8pPr>
+    <a:lvl9pPr marL="3657600" algn="l" defTabSz="914400" rtl="0" eaLnBrk="1" latinLnBrk="0" hangingPunct="1">
+      <a:defRPr sz="1200" kern="1200">
+        <a:solidFill>
+          <a:schemeClr val="tx1"/>
+        </a:solidFill>
+        <a:latin typeface="+mn-lt"/>
+        <a:ea typeface="+mn-ea"/>
+        <a:cs typeface="+mn-cs"/>
+      </a:defRPr>
+    </a:lvl9pPr>
+  </p:notesStyle>
+</p:notesMaster>
+</file>
+
+<file path=ppt/notesSlides/notesSlide1.xml><?xml version="1.0" encoding="utf-8"?>
+<p:notes xmlns:a="http://schemas.openxmlformats.org/drawingml/2006/main" xmlns:r="http://schemas.openxmlformats.org/officeDocument/2006/relationships" xmlns:p="http://schemas.openxmlformats.org/presentationml/2006/main">
+  <p:cSld>
+    <p:spTree>
+      <p:nvGrpSpPr>
+        <p:cNvPr id="1" name=""/>
+        <p:cNvGrpSpPr/>
+        <p:nvPr/>
+      </p:nvGrpSpPr>
+      <p:grpSpPr>
+        <a:xfrm>
+          <a:off x="0" y="0"/>
+          <a:ext cx="0" cy="0"/>
+          <a:chOff x="0" y="0"/>
+          <a:chExt cx="0" cy="0"/>
+        </a:xfrm>
+      </p:grpSpPr>
+      <p:sp>
+        <p:nvSpPr>
+          <p:cNvPr id="2" name="Espace réservé de l'image des diapositives 1"/>
+          <p:cNvSpPr>
+            <a:spLocks noGrp="1" noRot="1" noChangeAspect="1"/>
+          </p:cNvSpPr>
+          <p:nvPr>
+            <p:ph type="sldImg"/>
+          </p:nvPr>
+        </p:nvSpPr>
+        <p:spPr/>
+      </p:sp>
+      <p:sp>
+        <p:nvSpPr>
+          <p:cNvPr id="3" name="Espace réservé des notes 2"/>
+          <p:cNvSpPr>
+            <a:spLocks noGrp="1"/>
+          </p:cNvSpPr>
+          <p:nvPr>
+            <p:ph type="body" idx="1"/>
+          </p:nvPr>
+        </p:nvSpPr>
+        <p:spPr/>
+        <p:txBody>
+          <a:bodyPr/>
+          <a:lstStyle/>
+          <a:p>
+            <a:endParaRPr lang="fr-FR"/>
+          </a:p>
+        </p:txBody>
+      </p:sp>
+      <p:sp>
+        <p:nvSpPr>
+          <p:cNvPr id="4" name="Espace réservé du numéro de diapositive 3"/>
+          <p:cNvSpPr>
+            <a:spLocks noGrp="1"/>
+          </p:cNvSpPr>
+          <p:nvPr>
+            <p:ph type="sldNum" sz="quarter" idx="10"/>
+          </p:nvPr>
+        </p:nvSpPr>
+        <p:spPr/>
+        <p:txBody>
+          <a:bodyPr/>
+          <a:lstStyle/>
+          <a:p>
+            <a:fld id="{AAD9F55B-02C3-7443-8831-E227F1AFC2AA}" type="slidenum">
+              <a:rPr lang="fr-FR" smtClean="0"/>
+              <a:t>1</a:t>
+            </a:fld>
+            <a:endParaRPr lang="fr-FR"/>
+          </a:p>
+        </p:txBody>
+      </p:sp>
+    </p:spTree>
+    <p:extLst>
+      <p:ext uri="{BB962C8B-B14F-4D97-AF65-F5344CB8AC3E}">
+        <p14:creationId xmlns:p14="http://schemas.microsoft.com/office/powerpoint/2010/main" val="940269468"/>
+      </p:ext>
+    </p:extLst>
+  </p:cSld>
+  <p:clrMapOvr>
+    <a:masterClrMapping/>
+  </p:clrMapOvr>
+</p:notes>
+</file>
+
+<file path=ppt/notesSlides/notesSlide10.xml><?xml version="1.0" encoding="utf-8"?>
+<p:notes xmlns:a="http://schemas.openxmlformats.org/drawingml/2006/main" xmlns:r="http://schemas.openxmlformats.org/officeDocument/2006/relationships" xmlns:p="http://schemas.openxmlformats.org/presentationml/2006/main">
+  <p:cSld>
+    <p:spTree>
+      <p:nvGrpSpPr>
+        <p:cNvPr id="1" name=""/>
+        <p:cNvGrpSpPr/>
+        <p:nvPr/>
+      </p:nvGrpSpPr>
+      <p:grpSpPr>
+        <a:xfrm>
+          <a:off x="0" y="0"/>
+          <a:ext cx="0" cy="0"/>
+          <a:chOff x="0" y="0"/>
+          <a:chExt cx="0" cy="0"/>
+        </a:xfrm>
+      </p:grpSpPr>
+      <p:sp>
+        <p:nvSpPr>
+          <p:cNvPr id="2" name="Espace réservé de l'image des diapositives 1"/>
+          <p:cNvSpPr>
+            <a:spLocks noGrp="1" noRot="1" noChangeAspect="1"/>
+          </p:cNvSpPr>
+          <p:nvPr>
+            <p:ph type="sldImg"/>
+          </p:nvPr>
+        </p:nvSpPr>
+        <p:spPr/>
+      </p:sp>
+      <p:sp>
+        <p:nvSpPr>
+          <p:cNvPr id="3" name="Espace réservé des notes 2"/>
+          <p:cNvSpPr>
+            <a:spLocks noGrp="1"/>
+          </p:cNvSpPr>
+          <p:nvPr>
+            <p:ph type="body" idx="1"/>
+          </p:nvPr>
+        </p:nvSpPr>
+        <p:spPr/>
+        <p:txBody>
+          <a:bodyPr/>
+          <a:lstStyle/>
+          <a:p>
+            <a:endParaRPr lang="fr-FR"/>
+          </a:p>
+        </p:txBody>
+      </p:sp>
+      <p:sp>
+        <p:nvSpPr>
+          <p:cNvPr id="4" name="Espace réservé du numéro de diapositive 3"/>
+          <p:cNvSpPr>
+            <a:spLocks noGrp="1"/>
+          </p:cNvSpPr>
+          <p:nvPr>
+            <p:ph type="sldNum" sz="quarter" idx="10"/>
+          </p:nvPr>
+        </p:nvSpPr>
+        <p:spPr/>
+        <p:txBody>
+          <a:bodyPr/>
+          <a:lstStyle/>
+          <a:p>
+            <a:fld id="{AAD9F55B-02C3-7443-8831-E227F1AFC2AA}" type="slidenum">
+              <a:rPr lang="fr-FR" smtClean="0"/>
+              <a:t>10</a:t>
+            </a:fld>
+            <a:endParaRPr lang="fr-FR"/>
+          </a:p>
+        </p:txBody>
+      </p:sp>
+    </p:spTree>
+    <p:extLst>
+      <p:ext uri="{BB962C8B-B14F-4D97-AF65-F5344CB8AC3E}">
+        <p14:creationId xmlns:p14="http://schemas.microsoft.com/office/powerpoint/2010/main" val="2974788862"/>
+      </p:ext>
+    </p:extLst>
+  </p:cSld>
+  <p:clrMapOvr>
+    <a:masterClrMapping/>
+  </p:clrMapOvr>
+</p:notes>
+</file>
+
+<file path=ppt/notesSlides/notesSlide11.xml><?xml version="1.0" encoding="utf-8"?>
+<p:notes xmlns:a="http://schemas.openxmlformats.org/drawingml/2006/main" xmlns:r="http://schemas.openxmlformats.org/officeDocument/2006/relationships" xmlns:p="http://schemas.openxmlformats.org/presentationml/2006/main">
+  <p:cSld>
+    <p:spTree>
+      <p:nvGrpSpPr>
+        <p:cNvPr id="1" name=""/>
+        <p:cNvGrpSpPr/>
+        <p:nvPr/>
+      </p:nvGrpSpPr>
+      <p:grpSpPr>
+        <a:xfrm>
+          <a:off x="0" y="0"/>
+          <a:ext cx="0" cy="0"/>
+          <a:chOff x="0" y="0"/>
+          <a:chExt cx="0" cy="0"/>
+        </a:xfrm>
+      </p:grpSpPr>
+      <p:sp>
+        <p:nvSpPr>
+          <p:cNvPr id="2" name="Espace réservé de l'image des diapositives 1"/>
+          <p:cNvSpPr>
+            <a:spLocks noGrp="1" noRot="1" noChangeAspect="1"/>
+          </p:cNvSpPr>
+          <p:nvPr>
+            <p:ph type="sldImg"/>
+          </p:nvPr>
+        </p:nvSpPr>
+        <p:spPr/>
+      </p:sp>
+      <p:sp>
+        <p:nvSpPr>
+          <p:cNvPr id="3" name="Espace réservé des notes 2"/>
+          <p:cNvSpPr>
+            <a:spLocks noGrp="1"/>
+          </p:cNvSpPr>
+          <p:nvPr>
+            <p:ph type="body" idx="1"/>
+          </p:nvPr>
+        </p:nvSpPr>
+        <p:spPr/>
+        <p:txBody>
+          <a:bodyPr/>
+          <a:lstStyle/>
+          <a:p>
+            <a:endParaRPr lang="fr-FR"/>
+          </a:p>
+        </p:txBody>
+      </p:sp>
+      <p:sp>
+        <p:nvSpPr>
+          <p:cNvPr id="4" name="Espace réservé du numéro de diapositive 3"/>
+          <p:cNvSpPr>
+            <a:spLocks noGrp="1"/>
+          </p:cNvSpPr>
+          <p:nvPr>
+            <p:ph type="sldNum" sz="quarter" idx="10"/>
+          </p:nvPr>
+        </p:nvSpPr>
+        <p:spPr/>
+        <p:txBody>
+          <a:bodyPr/>
+          <a:lstStyle/>
+          <a:p>
+            <a:fld id="{AAD9F55B-02C3-7443-8831-E227F1AFC2AA}" type="slidenum">
+              <a:rPr lang="fr-FR" smtClean="0"/>
+              <a:t>11</a:t>
+            </a:fld>
+            <a:endParaRPr lang="fr-FR"/>
+          </a:p>
+        </p:txBody>
+      </p:sp>
+    </p:spTree>
+    <p:extLst>
+      <p:ext uri="{BB962C8B-B14F-4D97-AF65-F5344CB8AC3E}">
+        <p14:creationId xmlns:p14="http://schemas.microsoft.com/office/powerpoint/2010/main" val="3865087638"/>
+      </p:ext>
+    </p:extLst>
+  </p:cSld>
+  <p:clrMapOvr>
+    <a:masterClrMapping/>
+  </p:clrMapOvr>
+</p:notes>
+</file>
+
+<file path=ppt/notesSlides/notesSlide12.xml><?xml version="1.0" encoding="utf-8"?>
+<p:notes xmlns:a="http://schemas.openxmlformats.org/drawingml/2006/main" xmlns:r="http://schemas.openxmlformats.org/officeDocument/2006/relationships" xmlns:p="http://schemas.openxmlformats.org/presentationml/2006/main">
+  <p:cSld>
+    <p:spTree>
+      <p:nvGrpSpPr>
+        <p:cNvPr id="1" name=""/>
+        <p:cNvGrpSpPr/>
+        <p:nvPr/>
+      </p:nvGrpSpPr>
+      <p:grpSpPr>
+        <a:xfrm>
+          <a:off x="0" y="0"/>
+          <a:ext cx="0" cy="0"/>
+          <a:chOff x="0" y="0"/>
+          <a:chExt cx="0" cy="0"/>
+        </a:xfrm>
+      </p:grpSpPr>
+      <p:sp>
+        <p:nvSpPr>
+          <p:cNvPr id="2" name="Espace réservé de l'image des diapositives 1"/>
+          <p:cNvSpPr>
+            <a:spLocks noGrp="1" noRot="1" noChangeAspect="1"/>
+          </p:cNvSpPr>
+          <p:nvPr>
+            <p:ph type="sldImg"/>
+          </p:nvPr>
+        </p:nvSpPr>
+        <p:spPr/>
+      </p:sp>
+      <p:sp>
+        <p:nvSpPr>
+          <p:cNvPr id="3" name="Espace réservé des notes 2"/>
+          <p:cNvSpPr>
+            <a:spLocks noGrp="1"/>
+          </p:cNvSpPr>
+          <p:nvPr>
+            <p:ph type="body" idx="1"/>
+          </p:nvPr>
+        </p:nvSpPr>
+        <p:spPr/>
+        <p:txBody>
+          <a:bodyPr/>
+          <a:lstStyle/>
+          <a:p>
+            <a:endParaRPr lang="fr-FR"/>
+          </a:p>
+        </p:txBody>
+      </p:sp>
+      <p:sp>
+        <p:nvSpPr>
+          <p:cNvPr id="4" name="Espace réservé du numéro de diapositive 3"/>
+          <p:cNvSpPr>
+            <a:spLocks noGrp="1"/>
+          </p:cNvSpPr>
+          <p:nvPr>
+            <p:ph type="sldNum" sz="quarter" idx="10"/>
+          </p:nvPr>
+        </p:nvSpPr>
+        <p:spPr/>
+        <p:txBody>
+          <a:bodyPr/>
+          <a:lstStyle/>
+          <a:p>
+            <a:fld id="{AAD9F55B-02C3-7443-8831-E227F1AFC2AA}" type="slidenum">
+              <a:rPr lang="fr-FR" smtClean="0"/>
+              <a:t>12</a:t>
+            </a:fld>
+            <a:endParaRPr lang="fr-FR"/>
+          </a:p>
+        </p:txBody>
+      </p:sp>
+    </p:spTree>
+    <p:extLst>
+      <p:ext uri="{BB962C8B-B14F-4D97-AF65-F5344CB8AC3E}">
+        <p14:creationId xmlns:p14="http://schemas.microsoft.com/office/powerpoint/2010/main" val="3495972062"/>
+      </p:ext>
+    </p:extLst>
+  </p:cSld>
+  <p:clrMapOvr>
+    <a:masterClrMapping/>
+  </p:clrMapOvr>
+</p:notes>
+</file>
+
+<file path=ppt/notesSlides/notesSlide13.xml><?xml version="1.0" encoding="utf-8"?>
+<p:notes xmlns:a="http://schemas.openxmlformats.org/drawingml/2006/main" xmlns:r="http://schemas.openxmlformats.org/officeDocument/2006/relationships" xmlns:p="http://schemas.openxmlformats.org/presentationml/2006/main">
+  <p:cSld>
+    <p:spTree>
+      <p:nvGrpSpPr>
+        <p:cNvPr id="1" name=""/>
+        <p:cNvGrpSpPr/>
+        <p:nvPr/>
+      </p:nvGrpSpPr>
+      <p:grpSpPr>
+        <a:xfrm>
+          <a:off x="0" y="0"/>
+          <a:ext cx="0" cy="0"/>
+          <a:chOff x="0" y="0"/>
+          <a:chExt cx="0" cy="0"/>
+        </a:xfrm>
+      </p:grpSpPr>
+      <p:sp>
+        <p:nvSpPr>
+          <p:cNvPr id="2" name="Espace réservé de l'image des diapositives 1"/>
+          <p:cNvSpPr>
+            <a:spLocks noGrp="1" noRot="1" noChangeAspect="1"/>
+          </p:cNvSpPr>
+          <p:nvPr>
+            <p:ph type="sldImg"/>
+          </p:nvPr>
+        </p:nvSpPr>
+        <p:spPr/>
+      </p:sp>
+      <p:sp>
+        <p:nvSpPr>
+          <p:cNvPr id="3" name="Espace réservé des notes 2"/>
+          <p:cNvSpPr>
+            <a:spLocks noGrp="1"/>
+          </p:cNvSpPr>
+          <p:nvPr>
+            <p:ph type="body" idx="1"/>
+          </p:nvPr>
+        </p:nvSpPr>
+        <p:spPr/>
+        <p:txBody>
+          <a:bodyPr/>
+          <a:lstStyle/>
+          <a:p>
+            <a:endParaRPr lang="fr-FR"/>
+          </a:p>
+        </p:txBody>
+      </p:sp>
+      <p:sp>
+        <p:nvSpPr>
+          <p:cNvPr id="4" name="Espace réservé du numéro de diapositive 3"/>
+          <p:cNvSpPr>
+            <a:spLocks noGrp="1"/>
+          </p:cNvSpPr>
+          <p:nvPr>
+            <p:ph type="sldNum" sz="quarter" idx="10"/>
+          </p:nvPr>
+        </p:nvSpPr>
+        <p:spPr/>
+        <p:txBody>
+          <a:bodyPr/>
+          <a:lstStyle/>
+          <a:p>
+            <a:fld id="{AAD9F55B-02C3-7443-8831-E227F1AFC2AA}" type="slidenum">
+              <a:rPr lang="fr-FR" smtClean="0"/>
+              <a:t>13</a:t>
+            </a:fld>
+            <a:endParaRPr lang="fr-FR"/>
+          </a:p>
+        </p:txBody>
+      </p:sp>
+    </p:spTree>
+    <p:extLst>
+      <p:ext uri="{BB962C8B-B14F-4D97-AF65-F5344CB8AC3E}">
+        <p14:creationId xmlns:p14="http://schemas.microsoft.com/office/powerpoint/2010/main" val="4182542808"/>
+      </p:ext>
+    </p:extLst>
+  </p:cSld>
+  <p:clrMapOvr>
+    <a:masterClrMapping/>
+  </p:clrMapOvr>
+</p:notes>
+</file>
+
+<file path=ppt/notesSlides/notesSlide14.xml><?xml version="1.0" encoding="utf-8"?>
+<p:notes xmlns:a="http://schemas.openxmlformats.org/drawingml/2006/main" xmlns:r="http://schemas.openxmlformats.org/officeDocument/2006/relationships" xmlns:p="http://schemas.openxmlformats.org/presentationml/2006/main">
+  <p:cSld>
+    <p:spTree>
+      <p:nvGrpSpPr>
+        <p:cNvPr id="1" name=""/>
+        <p:cNvGrpSpPr/>
+        <p:nvPr/>
+      </p:nvGrpSpPr>
+      <p:grpSpPr>
+        <a:xfrm>
+          <a:off x="0" y="0"/>
+          <a:ext cx="0" cy="0"/>
+          <a:chOff x="0" y="0"/>
+          <a:chExt cx="0" cy="0"/>
+        </a:xfrm>
+      </p:grpSpPr>
+      <p:sp>
+        <p:nvSpPr>
+          <p:cNvPr id="2" name="Espace réservé de l'image des diapositives 1"/>
+          <p:cNvSpPr>
+            <a:spLocks noGrp="1" noRot="1" noChangeAspect="1"/>
+          </p:cNvSpPr>
+          <p:nvPr>
+            <p:ph type="sldImg"/>
+          </p:nvPr>
+        </p:nvSpPr>
+        <p:spPr/>
+      </p:sp>
+      <p:sp>
+        <p:nvSpPr>
+          <p:cNvPr id="3" name="Espace réservé des notes 2"/>
+          <p:cNvSpPr>
+            <a:spLocks noGrp="1"/>
+          </p:cNvSpPr>
+          <p:nvPr>
+            <p:ph type="body" idx="1"/>
+          </p:nvPr>
+        </p:nvSpPr>
+        <p:spPr/>
+        <p:txBody>
+          <a:bodyPr/>
+          <a:lstStyle/>
+          <a:p>
+            <a:endParaRPr lang="fr-FR"/>
+          </a:p>
+        </p:txBody>
+      </p:sp>
+      <p:sp>
+        <p:nvSpPr>
+          <p:cNvPr id="4" name="Espace réservé du numéro de diapositive 3"/>
+          <p:cNvSpPr>
+            <a:spLocks noGrp="1"/>
+          </p:cNvSpPr>
+          <p:nvPr>
+            <p:ph type="sldNum" sz="quarter" idx="10"/>
+          </p:nvPr>
+        </p:nvSpPr>
+        <p:spPr/>
+        <p:txBody>
+          <a:bodyPr/>
+          <a:lstStyle/>
+          <a:p>
+            <a:fld id="{AAD9F55B-02C3-7443-8831-E227F1AFC2AA}" type="slidenum">
+              <a:rPr lang="fr-FR" smtClean="0"/>
+              <a:t>14</a:t>
+            </a:fld>
+            <a:endParaRPr lang="fr-FR"/>
+          </a:p>
+        </p:txBody>
+      </p:sp>
+    </p:spTree>
+    <p:extLst>
+      <p:ext uri="{BB962C8B-B14F-4D97-AF65-F5344CB8AC3E}">
+        <p14:creationId xmlns:p14="http://schemas.microsoft.com/office/powerpoint/2010/main" val="4184762803"/>
+      </p:ext>
+    </p:extLst>
+  </p:cSld>
+  <p:clrMapOvr>
+    <a:masterClrMapping/>
+  </p:clrMapOvr>
+</p:notes>
+</file>
+
+<file path=ppt/notesSlides/notesSlide15.xml><?xml version="1.0" encoding="utf-8"?>
+<p:notes xmlns:a="http://schemas.openxmlformats.org/drawingml/2006/main" xmlns:r="http://schemas.openxmlformats.org/officeDocument/2006/relationships" xmlns:p="http://schemas.openxmlformats.org/presentationml/2006/main">
+  <p:cSld>
+    <p:spTree>
+      <p:nvGrpSpPr>
+        <p:cNvPr id="1" name=""/>
+        <p:cNvGrpSpPr/>
+        <p:nvPr/>
+      </p:nvGrpSpPr>
+      <p:grpSpPr>
+        <a:xfrm>
+          <a:off x="0" y="0"/>
+          <a:ext cx="0" cy="0"/>
+          <a:chOff x="0" y="0"/>
+          <a:chExt cx="0" cy="0"/>
+        </a:xfrm>
+      </p:grpSpPr>
+      <p:sp>
+        <p:nvSpPr>
+          <p:cNvPr id="2" name="Espace réservé de l'image des diapositives 1"/>
+          <p:cNvSpPr>
+            <a:spLocks noGrp="1" noRot="1" noChangeAspect="1"/>
+          </p:cNvSpPr>
+          <p:nvPr>
+            <p:ph type="sldImg"/>
+          </p:nvPr>
+        </p:nvSpPr>
+        <p:spPr/>
+      </p:sp>
+      <p:sp>
+        <p:nvSpPr>
+          <p:cNvPr id="3" name="Espace réservé des notes 2"/>
+          <p:cNvSpPr>
+            <a:spLocks noGrp="1"/>
+          </p:cNvSpPr>
+          <p:nvPr>
+            <p:ph type="body" idx="1"/>
+          </p:nvPr>
+        </p:nvSpPr>
+        <p:spPr/>
+        <p:txBody>
+          <a:bodyPr/>
+          <a:lstStyle/>
+          <a:p>
+            <a:endParaRPr lang="fr-FR"/>
+          </a:p>
+        </p:txBody>
+      </p:sp>
+      <p:sp>
+        <p:nvSpPr>
+          <p:cNvPr id="4" name="Espace réservé du numéro de diapositive 3"/>
+          <p:cNvSpPr>
+            <a:spLocks noGrp="1"/>
+          </p:cNvSpPr>
+          <p:nvPr>
+            <p:ph type="sldNum" sz="quarter" idx="10"/>
+          </p:nvPr>
+        </p:nvSpPr>
+        <p:spPr/>
+        <p:txBody>
+          <a:bodyPr/>
+          <a:lstStyle/>
+          <a:p>
+            <a:fld id="{AAD9F55B-02C3-7443-8831-E227F1AFC2AA}" type="slidenum">
+              <a:rPr lang="fr-FR" smtClean="0"/>
+              <a:t>15</a:t>
+            </a:fld>
+            <a:endParaRPr lang="fr-FR"/>
+          </a:p>
+        </p:txBody>
+      </p:sp>
+    </p:spTree>
+    <p:extLst>
+      <p:ext uri="{BB962C8B-B14F-4D97-AF65-F5344CB8AC3E}">
+        <p14:creationId xmlns:p14="http://schemas.microsoft.com/office/powerpoint/2010/main" val="455756969"/>
+      </p:ext>
+    </p:extLst>
+  </p:cSld>
+  <p:clrMapOvr>
+    <a:masterClrMapping/>
+  </p:clrMapOvr>
+</p:notes>
+</file>
+
+<file path=ppt/notesSlides/notesSlide2.xml><?xml version="1.0" encoding="utf-8"?>
+<p:notes xmlns:a="http://schemas.openxmlformats.org/drawingml/2006/main" xmlns:r="http://schemas.openxmlformats.org/officeDocument/2006/relationships" xmlns:p="http://schemas.openxmlformats.org/presentationml/2006/main">
+  <p:cSld>
+    <p:spTree>
+      <p:nvGrpSpPr>
+        <p:cNvPr id="1" name=""/>
+        <p:cNvGrpSpPr/>
+        <p:nvPr/>
+      </p:nvGrpSpPr>
+      <p:grpSpPr>
+        <a:xfrm>
+          <a:off x="0" y="0"/>
+          <a:ext cx="0" cy="0"/>
+          <a:chOff x="0" y="0"/>
+          <a:chExt cx="0" cy="0"/>
+        </a:xfrm>
+      </p:grpSpPr>
+      <p:sp>
+        <p:nvSpPr>
+          <p:cNvPr id="2" name="Espace réservé de l'image des diapositives 1"/>
+          <p:cNvSpPr>
+            <a:spLocks noGrp="1" noRot="1" noChangeAspect="1"/>
+          </p:cNvSpPr>
+          <p:nvPr>
+            <p:ph type="sldImg"/>
+          </p:nvPr>
+        </p:nvSpPr>
+        <p:spPr/>
+      </p:sp>
+      <p:sp>
+        <p:nvSpPr>
+          <p:cNvPr id="3" name="Espace réservé des notes 2"/>
+          <p:cNvSpPr>
+            <a:spLocks noGrp="1"/>
+          </p:cNvSpPr>
+          <p:nvPr>
+            <p:ph type="body" idx="1"/>
+          </p:nvPr>
+        </p:nvSpPr>
+        <p:spPr/>
+        <p:txBody>
+          <a:bodyPr/>
+          <a:lstStyle/>
+          <a:p>
+            <a:r>
+              <a:rPr lang="fr-FR" dirty="0"/>
+              <a:t>Dans la slide qui présente le sommaire, mettre uniquement les titres de niveau I.</a:t>
+            </a:r>
+          </a:p>
+          <a:p>
+            <a:r>
+              <a:rPr lang="fr-FR" dirty="0"/>
+              <a:t>Pour les slides qui présentent le titre de niveau I, mettre un sous-sommaire qui présente tous les sous-titres du titre.</a:t>
+            </a:r>
+          </a:p>
+        </p:txBody>
+      </p:sp>
+      <p:sp>
+        <p:nvSpPr>
+          <p:cNvPr id="4" name="Espace réservé du numéro de diapositive 3"/>
+          <p:cNvSpPr>
+            <a:spLocks noGrp="1"/>
+          </p:cNvSpPr>
+          <p:nvPr>
+            <p:ph type="sldNum" sz="quarter" idx="10"/>
+          </p:nvPr>
+        </p:nvSpPr>
+        <p:spPr/>
+        <p:txBody>
+          <a:bodyPr/>
+          <a:lstStyle/>
+          <a:p>
+            <a:fld id="{AAD9F55B-02C3-7443-8831-E227F1AFC2AA}" type="slidenum">
+              <a:rPr lang="fr-FR" smtClean="0"/>
+              <a:t>2</a:t>
+            </a:fld>
+            <a:endParaRPr lang="fr-FR"/>
+          </a:p>
+        </p:txBody>
+      </p:sp>
+    </p:spTree>
+    <p:extLst>
+      <p:ext uri="{BB962C8B-B14F-4D97-AF65-F5344CB8AC3E}">
+        <p14:creationId xmlns:p14="http://schemas.microsoft.com/office/powerpoint/2010/main" val="3288323010"/>
+      </p:ext>
+    </p:extLst>
+  </p:cSld>
+  <p:clrMapOvr>
+    <a:masterClrMapping/>
+  </p:clrMapOvr>
+</p:notes>
+</file>
+
+<file path=ppt/notesSlides/notesSlide3.xml><?xml version="1.0" encoding="utf-8"?>
+<p:notes xmlns:a="http://schemas.openxmlformats.org/drawingml/2006/main" xmlns:r="http://schemas.openxmlformats.org/officeDocument/2006/relationships" xmlns:p="http://schemas.openxmlformats.org/presentationml/2006/main">
+  <p:cSld>
+    <p:spTree>
+      <p:nvGrpSpPr>
+        <p:cNvPr id="1" name=""/>
+        <p:cNvGrpSpPr/>
+        <p:nvPr/>
+      </p:nvGrpSpPr>
+      <p:grpSpPr>
+        <a:xfrm>
+          <a:off x="0" y="0"/>
+          <a:ext cx="0" cy="0"/>
+          <a:chOff x="0" y="0"/>
+          <a:chExt cx="0" cy="0"/>
+        </a:xfrm>
+      </p:grpSpPr>
+      <p:sp>
+        <p:nvSpPr>
+          <p:cNvPr id="2" name="Espace réservé de l'image des diapositives 1"/>
+          <p:cNvSpPr>
+            <a:spLocks noGrp="1" noRot="1" noChangeAspect="1"/>
+          </p:cNvSpPr>
+          <p:nvPr>
+            <p:ph type="sldImg"/>
+          </p:nvPr>
+        </p:nvSpPr>
+        <p:spPr/>
+      </p:sp>
+      <p:sp>
+        <p:nvSpPr>
+          <p:cNvPr id="3" name="Espace réservé des notes 2"/>
+          <p:cNvSpPr>
+            <a:spLocks noGrp="1"/>
+          </p:cNvSpPr>
+          <p:nvPr>
+            <p:ph type="body" idx="1"/>
+          </p:nvPr>
+        </p:nvSpPr>
+        <p:spPr/>
+        <p:txBody>
+          <a:bodyPr/>
+          <a:lstStyle/>
+          <a:p>
+            <a:endParaRPr lang="fr-FR"/>
+          </a:p>
+        </p:txBody>
+      </p:sp>
+      <p:sp>
+        <p:nvSpPr>
+          <p:cNvPr id="4" name="Espace réservé du numéro de diapositive 3"/>
+          <p:cNvSpPr>
+            <a:spLocks noGrp="1"/>
+          </p:cNvSpPr>
+          <p:nvPr>
+            <p:ph type="sldNum" sz="quarter" idx="10"/>
+          </p:nvPr>
+        </p:nvSpPr>
+        <p:spPr/>
+        <p:txBody>
+          <a:bodyPr/>
+          <a:lstStyle/>
+          <a:p>
+            <a:fld id="{AAD9F55B-02C3-7443-8831-E227F1AFC2AA}" type="slidenum">
+              <a:rPr lang="fr-FR" smtClean="0"/>
+              <a:t>3</a:t>
+            </a:fld>
+            <a:endParaRPr lang="fr-FR"/>
+          </a:p>
+        </p:txBody>
+      </p:sp>
+    </p:spTree>
+    <p:extLst>
+      <p:ext uri="{BB962C8B-B14F-4D97-AF65-F5344CB8AC3E}">
+        <p14:creationId xmlns:p14="http://schemas.microsoft.com/office/powerpoint/2010/main" val="2543126894"/>
+      </p:ext>
+    </p:extLst>
+  </p:cSld>
+  <p:clrMapOvr>
+    <a:masterClrMapping/>
+  </p:clrMapOvr>
+</p:notes>
+</file>
+
+<file path=ppt/notesSlides/notesSlide4.xml><?xml version="1.0" encoding="utf-8"?>
+<p:notes xmlns:a="http://schemas.openxmlformats.org/drawingml/2006/main" xmlns:r="http://schemas.openxmlformats.org/officeDocument/2006/relationships" xmlns:p="http://schemas.openxmlformats.org/presentationml/2006/main">
+  <p:cSld>
+    <p:spTree>
+      <p:nvGrpSpPr>
+        <p:cNvPr id="1" name=""/>
+        <p:cNvGrpSpPr/>
+        <p:nvPr/>
+      </p:nvGrpSpPr>
+      <p:grpSpPr>
+        <a:xfrm>
+          <a:off x="0" y="0"/>
+          <a:ext cx="0" cy="0"/>
+          <a:chOff x="0" y="0"/>
+          <a:chExt cx="0" cy="0"/>
+        </a:xfrm>
+      </p:grpSpPr>
+      <p:sp>
+        <p:nvSpPr>
+          <p:cNvPr id="2" name="Espace réservé de l'image des diapositives 1"/>
+          <p:cNvSpPr>
+            <a:spLocks noGrp="1" noRot="1" noChangeAspect="1"/>
+          </p:cNvSpPr>
+          <p:nvPr>
+            <p:ph type="sldImg"/>
+          </p:nvPr>
+        </p:nvSpPr>
+        <p:spPr/>
+      </p:sp>
+      <p:sp>
+        <p:nvSpPr>
+          <p:cNvPr id="3" name="Espace réservé des notes 2"/>
+          <p:cNvSpPr>
+            <a:spLocks noGrp="1"/>
+          </p:cNvSpPr>
+          <p:nvPr>
+            <p:ph type="body" idx="1"/>
+          </p:nvPr>
+        </p:nvSpPr>
+        <p:spPr/>
+        <p:txBody>
+          <a:bodyPr/>
+          <a:lstStyle/>
+          <a:p>
+            <a:endParaRPr lang="fr-FR"/>
+          </a:p>
+        </p:txBody>
+      </p:sp>
+      <p:sp>
+        <p:nvSpPr>
+          <p:cNvPr id="4" name="Espace réservé du numéro de diapositive 3"/>
+          <p:cNvSpPr>
+            <a:spLocks noGrp="1"/>
+          </p:cNvSpPr>
+          <p:nvPr>
+            <p:ph type="sldNum" sz="quarter" idx="10"/>
+          </p:nvPr>
+        </p:nvSpPr>
+        <p:spPr/>
+        <p:txBody>
+          <a:bodyPr/>
+          <a:lstStyle/>
+          <a:p>
+            <a:fld id="{AAD9F55B-02C3-7443-8831-E227F1AFC2AA}" type="slidenum">
+              <a:rPr lang="fr-FR" smtClean="0"/>
+              <a:t>4</a:t>
+            </a:fld>
+            <a:endParaRPr lang="fr-FR"/>
+          </a:p>
+        </p:txBody>
+      </p:sp>
+    </p:spTree>
+    <p:extLst>
+      <p:ext uri="{BB962C8B-B14F-4D97-AF65-F5344CB8AC3E}">
+        <p14:creationId xmlns:p14="http://schemas.microsoft.com/office/powerpoint/2010/main" val="2450490479"/>
+      </p:ext>
+    </p:extLst>
+  </p:cSld>
+  <p:clrMapOvr>
+    <a:masterClrMapping/>
+  </p:clrMapOvr>
+</p:notes>
+</file>
+
+<file path=ppt/notesSlides/notesSlide5.xml><?xml version="1.0" encoding="utf-8"?>
+<p:notes xmlns:a="http://schemas.openxmlformats.org/drawingml/2006/main" xmlns:r="http://schemas.openxmlformats.org/officeDocument/2006/relationships" xmlns:p="http://schemas.openxmlformats.org/presentationml/2006/main">
+  <p:cSld>
+    <p:spTree>
+      <p:nvGrpSpPr>
+        <p:cNvPr id="1" name=""/>
+        <p:cNvGrpSpPr/>
+        <p:nvPr/>
+      </p:nvGrpSpPr>
+      <p:grpSpPr>
+        <a:xfrm>
+          <a:off x="0" y="0"/>
+          <a:ext cx="0" cy="0"/>
+          <a:chOff x="0" y="0"/>
+          <a:chExt cx="0" cy="0"/>
+        </a:xfrm>
+      </p:grpSpPr>
+      <p:sp>
+        <p:nvSpPr>
+          <p:cNvPr id="2" name="Espace réservé de l'image des diapositives 1"/>
+          <p:cNvSpPr>
+            <a:spLocks noGrp="1" noRot="1" noChangeAspect="1"/>
+          </p:cNvSpPr>
+          <p:nvPr>
+            <p:ph type="sldImg"/>
+          </p:nvPr>
+        </p:nvSpPr>
+        <p:spPr/>
+      </p:sp>
+      <p:sp>
+        <p:nvSpPr>
+          <p:cNvPr id="3" name="Espace réservé des notes 2"/>
+          <p:cNvSpPr>
+            <a:spLocks noGrp="1"/>
+          </p:cNvSpPr>
+          <p:nvPr>
+            <p:ph type="body" idx="1"/>
+          </p:nvPr>
+        </p:nvSpPr>
+        <p:spPr/>
+        <p:txBody>
+          <a:bodyPr/>
+          <a:lstStyle/>
+          <a:p>
+            <a:endParaRPr lang="fr-FR"/>
+          </a:p>
+        </p:txBody>
+      </p:sp>
+      <p:sp>
+        <p:nvSpPr>
+          <p:cNvPr id="4" name="Espace réservé du numéro de diapositive 3"/>
+          <p:cNvSpPr>
+            <a:spLocks noGrp="1"/>
+          </p:cNvSpPr>
+          <p:nvPr>
+            <p:ph type="sldNum" sz="quarter" idx="10"/>
+          </p:nvPr>
+        </p:nvSpPr>
+        <p:spPr/>
+        <p:txBody>
+          <a:bodyPr/>
+          <a:lstStyle/>
+          <a:p>
+            <a:fld id="{AAD9F55B-02C3-7443-8831-E227F1AFC2AA}" type="slidenum">
+              <a:rPr lang="fr-FR" smtClean="0"/>
+              <a:t>5</a:t>
+            </a:fld>
+            <a:endParaRPr lang="fr-FR"/>
+          </a:p>
+        </p:txBody>
+      </p:sp>
+    </p:spTree>
+    <p:extLst>
+      <p:ext uri="{BB962C8B-B14F-4D97-AF65-F5344CB8AC3E}">
+        <p14:creationId xmlns:p14="http://schemas.microsoft.com/office/powerpoint/2010/main" val="332853062"/>
+      </p:ext>
+    </p:extLst>
+  </p:cSld>
+  <p:clrMapOvr>
+    <a:masterClrMapping/>
+  </p:clrMapOvr>
+</p:notes>
+</file>
+
+<file path=ppt/notesSlides/notesSlide6.xml><?xml version="1.0" encoding="utf-8"?>
+<p:notes xmlns:a="http://schemas.openxmlformats.org/drawingml/2006/main" xmlns:r="http://schemas.openxmlformats.org/officeDocument/2006/relationships" xmlns:p="http://schemas.openxmlformats.org/presentationml/2006/main">
+  <p:cSld>
+    <p:spTree>
+      <p:nvGrpSpPr>
+        <p:cNvPr id="1" name=""/>
+        <p:cNvGrpSpPr/>
+        <p:nvPr/>
+      </p:nvGrpSpPr>
+      <p:grpSpPr>
+        <a:xfrm>
+          <a:off x="0" y="0"/>
+          <a:ext cx="0" cy="0"/>
+          <a:chOff x="0" y="0"/>
+          <a:chExt cx="0" cy="0"/>
+        </a:xfrm>
+      </p:grpSpPr>
+      <p:sp>
+        <p:nvSpPr>
+          <p:cNvPr id="2" name="Espace réservé de l'image des diapositives 1"/>
+          <p:cNvSpPr>
+            <a:spLocks noGrp="1" noRot="1" noChangeAspect="1"/>
+          </p:cNvSpPr>
+          <p:nvPr>
+            <p:ph type="sldImg"/>
+          </p:nvPr>
+        </p:nvSpPr>
+        <p:spPr/>
+      </p:sp>
+      <p:sp>
+        <p:nvSpPr>
+          <p:cNvPr id="3" name="Espace réservé des notes 2"/>
+          <p:cNvSpPr>
+            <a:spLocks noGrp="1"/>
+          </p:cNvSpPr>
+          <p:nvPr>
+            <p:ph type="body" idx="1"/>
+          </p:nvPr>
+        </p:nvSpPr>
+        <p:spPr/>
+        <p:txBody>
+          <a:bodyPr/>
+          <a:lstStyle/>
+          <a:p>
+            <a:endParaRPr lang="fr-FR"/>
+          </a:p>
+        </p:txBody>
+      </p:sp>
+      <p:sp>
+        <p:nvSpPr>
+          <p:cNvPr id="4" name="Espace réservé du numéro de diapositive 3"/>
+          <p:cNvSpPr>
+            <a:spLocks noGrp="1"/>
+          </p:cNvSpPr>
+          <p:nvPr>
+            <p:ph type="sldNum" sz="quarter" idx="10"/>
+          </p:nvPr>
+        </p:nvSpPr>
+        <p:spPr/>
+        <p:txBody>
+          <a:bodyPr/>
+          <a:lstStyle/>
+          <a:p>
+            <a:fld id="{AAD9F55B-02C3-7443-8831-E227F1AFC2AA}" type="slidenum">
+              <a:rPr lang="fr-FR" smtClean="0"/>
+              <a:t>6</a:t>
+            </a:fld>
+            <a:endParaRPr lang="fr-FR"/>
+          </a:p>
+        </p:txBody>
+      </p:sp>
+    </p:spTree>
+    <p:extLst>
+      <p:ext uri="{BB962C8B-B14F-4D97-AF65-F5344CB8AC3E}">
+        <p14:creationId xmlns:p14="http://schemas.microsoft.com/office/powerpoint/2010/main" val="469428294"/>
+      </p:ext>
+    </p:extLst>
+  </p:cSld>
+  <p:clrMapOvr>
+    <a:masterClrMapping/>
+  </p:clrMapOvr>
+</p:notes>
+</file>
+
+<file path=ppt/notesSlides/notesSlide7.xml><?xml version="1.0" encoding="utf-8"?>
+<p:notes xmlns:a="http://schemas.openxmlformats.org/drawingml/2006/main" xmlns:r="http://schemas.openxmlformats.org/officeDocument/2006/relationships" xmlns:p="http://schemas.openxmlformats.org/presentationml/2006/main">
+  <p:cSld>
+    <p:spTree>
+      <p:nvGrpSpPr>
+        <p:cNvPr id="1" name=""/>
+        <p:cNvGrpSpPr/>
+        <p:nvPr/>
+      </p:nvGrpSpPr>
+      <p:grpSpPr>
+        <a:xfrm>
+          <a:off x="0" y="0"/>
+          <a:ext cx="0" cy="0"/>
+          <a:chOff x="0" y="0"/>
+          <a:chExt cx="0" cy="0"/>
+        </a:xfrm>
+      </p:grpSpPr>
+      <p:sp>
+        <p:nvSpPr>
+          <p:cNvPr id="2" name="Espace réservé de l'image des diapositives 1"/>
+          <p:cNvSpPr>
+            <a:spLocks noGrp="1" noRot="1" noChangeAspect="1"/>
+          </p:cNvSpPr>
+          <p:nvPr>
+            <p:ph type="sldImg"/>
+          </p:nvPr>
+        </p:nvSpPr>
+        <p:spPr/>
+      </p:sp>
+      <p:sp>
+        <p:nvSpPr>
+          <p:cNvPr id="3" name="Espace réservé des notes 2"/>
+          <p:cNvSpPr>
+            <a:spLocks noGrp="1"/>
+          </p:cNvSpPr>
+          <p:nvPr>
+            <p:ph type="body" idx="1"/>
+          </p:nvPr>
+        </p:nvSpPr>
+        <p:spPr/>
+        <p:txBody>
+          <a:bodyPr/>
+          <a:lstStyle/>
+          <a:p>
+            <a:endParaRPr lang="fr-FR"/>
+          </a:p>
+        </p:txBody>
+      </p:sp>
+      <p:sp>
+        <p:nvSpPr>
+          <p:cNvPr id="4" name="Espace réservé du numéro de diapositive 3"/>
+          <p:cNvSpPr>
+            <a:spLocks noGrp="1"/>
+          </p:cNvSpPr>
+          <p:nvPr>
+            <p:ph type="sldNum" sz="quarter" idx="10"/>
+          </p:nvPr>
+        </p:nvSpPr>
+        <p:spPr/>
+        <p:txBody>
+          <a:bodyPr/>
+          <a:lstStyle/>
+          <a:p>
+            <a:fld id="{AAD9F55B-02C3-7443-8831-E227F1AFC2AA}" type="slidenum">
+              <a:rPr lang="fr-FR" smtClean="0"/>
+              <a:t>7</a:t>
+            </a:fld>
+            <a:endParaRPr lang="fr-FR"/>
+          </a:p>
+        </p:txBody>
+      </p:sp>
+    </p:spTree>
+    <p:extLst>
+      <p:ext uri="{BB962C8B-B14F-4D97-AF65-F5344CB8AC3E}">
+        <p14:creationId xmlns:p14="http://schemas.microsoft.com/office/powerpoint/2010/main" val="4031937830"/>
+      </p:ext>
+    </p:extLst>
+  </p:cSld>
+  <p:clrMapOvr>
+    <a:masterClrMapping/>
+  </p:clrMapOvr>
+</p:notes>
+</file>
+
+<file path=ppt/notesSlides/notesSlide8.xml><?xml version="1.0" encoding="utf-8"?>
+<p:notes xmlns:a="http://schemas.openxmlformats.org/drawingml/2006/main" xmlns:r="http://schemas.openxmlformats.org/officeDocument/2006/relationships" xmlns:p="http://schemas.openxmlformats.org/presentationml/2006/main">
+  <p:cSld>
+    <p:spTree>
+      <p:nvGrpSpPr>
+        <p:cNvPr id="1" name=""/>
+        <p:cNvGrpSpPr/>
+        <p:nvPr/>
+      </p:nvGrpSpPr>
+      <p:grpSpPr>
+        <a:xfrm>
+          <a:off x="0" y="0"/>
+          <a:ext cx="0" cy="0"/>
+          <a:chOff x="0" y="0"/>
+          <a:chExt cx="0" cy="0"/>
+        </a:xfrm>
+      </p:grpSpPr>
+      <p:sp>
+        <p:nvSpPr>
+          <p:cNvPr id="2" name="Espace réservé de l'image des diapositives 1"/>
+          <p:cNvSpPr>
+            <a:spLocks noGrp="1" noRot="1" noChangeAspect="1"/>
+          </p:cNvSpPr>
+          <p:nvPr>
+            <p:ph type="sldImg"/>
+          </p:nvPr>
+        </p:nvSpPr>
+        <p:spPr/>
+      </p:sp>
+      <p:sp>
+        <p:nvSpPr>
+          <p:cNvPr id="3" name="Espace réservé des notes 2"/>
+          <p:cNvSpPr>
+            <a:spLocks noGrp="1"/>
+          </p:cNvSpPr>
+          <p:nvPr>
+            <p:ph type="body" idx="1"/>
+          </p:nvPr>
+        </p:nvSpPr>
+        <p:spPr/>
+        <p:txBody>
+          <a:bodyPr/>
+          <a:lstStyle/>
+          <a:p>
+            <a:endParaRPr lang="fr-FR"/>
+          </a:p>
+        </p:txBody>
+      </p:sp>
+      <p:sp>
+        <p:nvSpPr>
+          <p:cNvPr id="4" name="Espace réservé du numéro de diapositive 3"/>
+          <p:cNvSpPr>
+            <a:spLocks noGrp="1"/>
+          </p:cNvSpPr>
+          <p:nvPr>
+            <p:ph type="sldNum" sz="quarter" idx="10"/>
+          </p:nvPr>
+        </p:nvSpPr>
+        <p:spPr/>
+        <p:txBody>
+          <a:bodyPr/>
+          <a:lstStyle/>
+          <a:p>
+            <a:fld id="{AAD9F55B-02C3-7443-8831-E227F1AFC2AA}" type="slidenum">
+              <a:rPr lang="fr-FR" smtClean="0"/>
+              <a:t>8</a:t>
+            </a:fld>
+            <a:endParaRPr lang="fr-FR"/>
+          </a:p>
+        </p:txBody>
+      </p:sp>
+    </p:spTree>
+    <p:extLst>
+      <p:ext uri="{BB962C8B-B14F-4D97-AF65-F5344CB8AC3E}">
+        <p14:creationId xmlns:p14="http://schemas.microsoft.com/office/powerpoint/2010/main" val="804528697"/>
+      </p:ext>
+    </p:extLst>
+  </p:cSld>
+  <p:clrMapOvr>
+    <a:masterClrMapping/>
+  </p:clrMapOvr>
+</p:notes>
+</file>
+
+<file path=ppt/notesSlides/notesSlide9.xml><?xml version="1.0" encoding="utf-8"?>
+<p:notes xmlns:a="http://schemas.openxmlformats.org/drawingml/2006/main" xmlns:r="http://schemas.openxmlformats.org/officeDocument/2006/relationships" xmlns:p="http://schemas.openxmlformats.org/presentationml/2006/main">
+  <p:cSld>
+    <p:spTree>
+      <p:nvGrpSpPr>
+        <p:cNvPr id="1" name=""/>
+        <p:cNvGrpSpPr/>
+        <p:nvPr/>
+      </p:nvGrpSpPr>
+      <p:grpSpPr>
+        <a:xfrm>
+          <a:off x="0" y="0"/>
+          <a:ext cx="0" cy="0"/>
+          <a:chOff x="0" y="0"/>
+          <a:chExt cx="0" cy="0"/>
+        </a:xfrm>
+      </p:grpSpPr>
+      <p:sp>
+        <p:nvSpPr>
+          <p:cNvPr id="2" name="Espace réservé de l'image des diapositives 1"/>
+          <p:cNvSpPr>
+            <a:spLocks noGrp="1" noRot="1" noChangeAspect="1"/>
+          </p:cNvSpPr>
+          <p:nvPr>
+            <p:ph type="sldImg"/>
+          </p:nvPr>
+        </p:nvSpPr>
+        <p:spPr/>
+      </p:sp>
+      <p:sp>
+        <p:nvSpPr>
+          <p:cNvPr id="3" name="Espace réservé des notes 2"/>
+          <p:cNvSpPr>
+            <a:spLocks noGrp="1"/>
+          </p:cNvSpPr>
+          <p:nvPr>
+            <p:ph type="body" idx="1"/>
+          </p:nvPr>
+        </p:nvSpPr>
+        <p:spPr/>
+        <p:txBody>
+          <a:bodyPr/>
+          <a:lstStyle/>
+          <a:p>
+            <a:endParaRPr lang="fr-FR"/>
+          </a:p>
+        </p:txBody>
+      </p:sp>
+      <p:sp>
+        <p:nvSpPr>
+          <p:cNvPr id="4" name="Espace réservé du numéro de diapositive 3"/>
+          <p:cNvSpPr>
+            <a:spLocks noGrp="1"/>
+          </p:cNvSpPr>
+          <p:nvPr>
+            <p:ph type="sldNum" sz="quarter" idx="10"/>
+          </p:nvPr>
+        </p:nvSpPr>
+        <p:spPr/>
+        <p:txBody>
+          <a:bodyPr/>
+          <a:lstStyle/>
+          <a:p>
+            <a:fld id="{AAD9F55B-02C3-7443-8831-E227F1AFC2AA}" type="slidenum">
+              <a:rPr lang="fr-FR" smtClean="0"/>
+              <a:t>9</a:t>
+            </a:fld>
+            <a:endParaRPr lang="fr-FR"/>
+          </a:p>
+        </p:txBody>
+      </p:sp>
+    </p:spTree>
+    <p:extLst>
+      <p:ext uri="{BB962C8B-B14F-4D97-AF65-F5344CB8AC3E}">
+        <p14:creationId xmlns:p14="http://schemas.microsoft.com/office/powerpoint/2010/main" val="4070745054"/>
+      </p:ext>
+    </p:extLst>
+  </p:cSld>
+  <p:clrMapOvr>
+    <a:masterClrMapping/>
+  </p:clrMapOvr>
+</p:notes>
+</file>
+
 <file path=ppt/slideLayouts/slideLayout1.xml><?xml version="1.0" encoding="utf-8"?>
 <p:sldLayout xmlns:a="http://schemas.openxmlformats.org/drawingml/2006/main" xmlns:r="http://schemas.openxmlformats.org/officeDocument/2006/relationships" xmlns:p="http://schemas.openxmlformats.org/presentationml/2006/main" type="title" preserve="1">
   <p:cSld name="Diapositive de titre">
@@ -255,7 +1864,7 @@
           <a:p>
             <a:fld id="{C6D45237-D87D-4A47-8BA5-BE98C3F874AF}" type="datetimeFigureOut">
               <a:rPr lang="fr-FR" smtClean="0"/>
-              <a:t>30/05/2018</a:t>
+              <a:t>13/06/2018</a:t>
             </a:fld>
             <a:endParaRPr lang="fr-FR"/>
           </a:p>
@@ -401,7 +2010,7 @@
           <a:p>
             <a:fld id="{C6D45237-D87D-4A47-8BA5-BE98C3F874AF}" type="datetimeFigureOut">
               <a:rPr lang="fr-FR" smtClean="0"/>
-              <a:t>30/05/2018</a:t>
+              <a:t>13/06/2018</a:t>
             </a:fld>
             <a:endParaRPr lang="fr-FR"/>
           </a:p>
@@ -557,7 +2166,7 @@
           <a:p>
             <a:fld id="{C6D45237-D87D-4A47-8BA5-BE98C3F874AF}" type="datetimeFigureOut">
               <a:rPr lang="fr-FR" smtClean="0"/>
-              <a:t>30/05/2018</a:t>
+              <a:t>13/06/2018</a:t>
             </a:fld>
             <a:endParaRPr lang="fr-FR"/>
           </a:p>
@@ -703,7 +2312,7 @@
           <a:p>
             <a:fld id="{C6D45237-D87D-4A47-8BA5-BE98C3F874AF}" type="datetimeFigureOut">
               <a:rPr lang="fr-FR" smtClean="0"/>
-              <a:t>30/05/2018</a:t>
+              <a:t>13/06/2018</a:t>
             </a:fld>
             <a:endParaRPr lang="fr-FR"/>
           </a:p>
@@ -952,7 +2561,7 @@
           <a:p>
             <a:fld id="{C6D45237-D87D-4A47-8BA5-BE98C3F874AF}" type="datetimeFigureOut">
               <a:rPr lang="fr-FR" smtClean="0"/>
-              <a:t>30/05/2018</a:t>
+              <a:t>13/06/2018</a:t>
             </a:fld>
             <a:endParaRPr lang="fr-FR"/>
           </a:p>
@@ -1136,7 +2745,7 @@
           <a:p>
             <a:fld id="{C6D45237-D87D-4A47-8BA5-BE98C3F874AF}" type="datetimeFigureOut">
               <a:rPr lang="fr-FR" smtClean="0"/>
-              <a:t>30/05/2018</a:t>
+              <a:t>13/06/2018</a:t>
             </a:fld>
             <a:endParaRPr lang="fr-FR"/>
           </a:p>
@@ -1465,7 +3074,7 @@
           <a:p>
             <a:fld id="{C6D45237-D87D-4A47-8BA5-BE98C3F874AF}" type="datetimeFigureOut">
               <a:rPr lang="fr-FR" smtClean="0"/>
-              <a:t>30/05/2018</a:t>
+              <a:t>13/06/2018</a:t>
             </a:fld>
             <a:endParaRPr lang="fr-FR"/>
           </a:p>
@@ -1583,7 +3192,7 @@
           <a:p>
             <a:fld id="{C6D45237-D87D-4A47-8BA5-BE98C3F874AF}" type="datetimeFigureOut">
               <a:rPr lang="fr-FR" smtClean="0"/>
-              <a:t>30/05/2018</a:t>
+              <a:t>13/06/2018</a:t>
             </a:fld>
             <a:endParaRPr lang="fr-FR"/>
           </a:p>
@@ -1678,7 +3287,7 @@
           <a:p>
             <a:fld id="{C6D45237-D87D-4A47-8BA5-BE98C3F874AF}" type="datetimeFigureOut">
               <a:rPr lang="fr-FR" smtClean="0"/>
-              <a:t>30/05/2018</a:t>
+              <a:t>13/06/2018</a:t>
             </a:fld>
             <a:endParaRPr lang="fr-FR"/>
           </a:p>
@@ -1936,7 +3545,7 @@
           <a:p>
             <a:fld id="{C6D45237-D87D-4A47-8BA5-BE98C3F874AF}" type="datetimeFigureOut">
               <a:rPr lang="fr-FR" smtClean="0"/>
-              <a:t>30/05/2018</a:t>
+              <a:t>13/06/2018</a:t>
             </a:fld>
             <a:endParaRPr lang="fr-FR"/>
           </a:p>
@@ -2198,7 +3807,7 @@
           <a:p>
             <a:fld id="{C6D45237-D87D-4A47-8BA5-BE98C3F874AF}" type="datetimeFigureOut">
               <a:rPr lang="fr-FR" smtClean="0"/>
-              <a:t>30/05/2018</a:t>
+              <a:t>13/06/2018</a:t>
             </a:fld>
             <a:endParaRPr lang="fr-FR"/>
           </a:p>
@@ -2388,7 +3997,7 @@
             <a:fld id="{C6D45237-D87D-4A47-8BA5-BE98C3F874AF}" type="datetimeFigureOut">
               <a:rPr lang="fr-FR" smtClean="0"/>
               <a:pPr/>
-              <a:t>30/05/2018</a:t>
+              <a:t>13/06/2018</a:t>
             </a:fld>
             <a:endParaRPr lang="fr-FR" dirty="0"/>
           </a:p>
@@ -2780,14 +4389,6 @@
 <file path=ppt/slides/slide1.xml><?xml version="1.0" encoding="utf-8"?>
 <p:sld xmlns:a="http://schemas.openxmlformats.org/drawingml/2006/main" xmlns:r="http://schemas.openxmlformats.org/officeDocument/2006/relationships" xmlns:p="http://schemas.openxmlformats.org/presentationml/2006/main">
   <p:cSld>
-    <p:bg>
-      <p:bgPr>
-        <a:solidFill>
-          <a:srgbClr val="FAFAFA"/>
-        </a:solidFill>
-        <a:effectLst/>
-      </p:bgPr>
-    </p:bg>
     <p:spTree>
       <p:nvGrpSpPr>
         <p:cNvPr id="1" name=""/>
@@ -2875,19 +4476,19 @@
         </p:nvSpPr>
         <p:spPr>
           <a:xfrm>
-            <a:off x="4425046" y="5113928"/>
-            <a:ext cx="1552904" cy="650057"/>
+            <a:off x="4425045" y="5070384"/>
+            <a:ext cx="2672441" cy="1275986"/>
           </a:xfrm>
         </p:spPr>
         <p:txBody>
           <a:bodyPr>
-            <a:normAutofit fontScale="70000" lnSpcReduction="20000"/>
+            <a:normAutofit/>
           </a:bodyPr>
           <a:lstStyle/>
           <a:p>
             <a:pPr algn="l"/>
             <a:r>
-              <a:rPr lang="fr-FR" dirty="0">
+              <a:rPr lang="fr-FR" sz="1800" dirty="0">
                 <a:solidFill>
                   <a:schemeClr val="bg1">
                     <a:lumMod val="65000"/>
@@ -2902,7 +4503,7 @@
           <a:p>
             <a:pPr algn="l"/>
             <a:r>
-              <a:rPr lang="fr-FR" dirty="0">
+              <a:rPr lang="fr-FR" sz="1800" dirty="0">
                 <a:solidFill>
                   <a:schemeClr val="bg1">
                     <a:lumMod val="65000"/>
@@ -2914,6 +4515,21 @@
               <a:t>Martin d’Allens</a:t>
             </a:r>
           </a:p>
+          <a:p>
+            <a:pPr algn="l"/>
+            <a:r>
+              <a:rPr lang="fr-FR" sz="1800" dirty="0">
+                <a:solidFill>
+                  <a:schemeClr val="bg1">
+                    <a:lumMod val="65000"/>
+                  </a:schemeClr>
+                </a:solidFill>
+                <a:latin typeface="SF UI Display Light" pitchFamily="2" charset="0"/>
+                <a:ea typeface="SF UI Display Light" pitchFamily="2" charset="0"/>
+              </a:rPr>
+              <a:t>Liberty Rider</a:t>
+            </a:r>
+          </a:p>
         </p:txBody>
       </p:sp>
       <p:sp>
@@ -2932,8 +4548,8 @@
         </p:nvSpPr>
         <p:spPr>
           <a:xfrm>
-            <a:off x="3127485" y="5083810"/>
-            <a:ext cx="1158766" cy="680175"/>
+            <a:off x="1143000" y="5083810"/>
+            <a:ext cx="3143251" cy="1589133"/>
           </a:xfrm>
           <a:prstGeom prst="rect">
             <a:avLst/>
@@ -2941,7 +4557,7 @@
         </p:spPr>
         <p:txBody>
           <a:bodyPr vert="horz" lIns="68580" tIns="34290" rIns="68580" bIns="34290" rtlCol="0">
-            <a:normAutofit lnSpcReduction="10000"/>
+            <a:normAutofit/>
           </a:bodyPr>
           <a:lstStyle>
             <a:lvl1pPr marL="0" indent="0" algn="ctr" defTabSz="914400" rtl="0" eaLnBrk="1" latinLnBrk="0" hangingPunct="1">
@@ -3136,6 +4752,21 @@
               </a:rPr>
               <a:t>Tuteur</a:t>
             </a:r>
+          </a:p>
+          <a:p>
+            <a:pPr algn="r"/>
+            <a:r>
+              <a:rPr lang="fr-FR" sz="1800" dirty="0">
+                <a:solidFill>
+                  <a:schemeClr val="bg1">
+                    <a:lumMod val="50000"/>
+                  </a:schemeClr>
+                </a:solidFill>
+                <a:latin typeface="SF UI Display Light" pitchFamily="2" charset="0"/>
+                <a:ea typeface="SF UI Display Light" pitchFamily="2" charset="0"/>
+              </a:rPr>
+              <a:t>Entreprise</a:t>
+            </a:r>
             <a:endParaRPr lang="fr-FR" sz="1800" dirty="0">
               <a:solidFill>
                 <a:schemeClr val="bg1">
@@ -3152,6 +4783,634 @@
     <p:extLst>
       <p:ext uri="{BB962C8B-B14F-4D97-AF65-F5344CB8AC3E}">
         <p14:creationId xmlns:p14="http://schemas.microsoft.com/office/powerpoint/2010/main" val="422938715"/>
+      </p:ext>
+    </p:extLst>
+  </p:cSld>
+  <p:clrMapOvr>
+    <a:masterClrMapping/>
+  </p:clrMapOvr>
+</p:sld>
+</file>
+
+<file path=ppt/slides/slide10.xml><?xml version="1.0" encoding="utf-8"?>
+<p:sld xmlns:a="http://schemas.openxmlformats.org/drawingml/2006/main" xmlns:r="http://schemas.openxmlformats.org/officeDocument/2006/relationships" xmlns:p="http://schemas.openxmlformats.org/presentationml/2006/main">
+  <p:cSld>
+    <p:spTree>
+      <p:nvGrpSpPr>
+        <p:cNvPr id="1" name=""/>
+        <p:cNvGrpSpPr/>
+        <p:nvPr/>
+      </p:nvGrpSpPr>
+      <p:grpSpPr>
+        <a:xfrm>
+          <a:off x="0" y="0"/>
+          <a:ext cx="0" cy="0"/>
+          <a:chOff x="0" y="0"/>
+          <a:chExt cx="0" cy="0"/>
+        </a:xfrm>
+      </p:grpSpPr>
+      <p:sp>
+        <p:nvSpPr>
+          <p:cNvPr id="2" name="Titre 1">
+            <a:extLst>
+              <a:ext uri="{FF2B5EF4-FFF2-40B4-BE49-F238E27FC236}">
+                <a16:creationId xmlns:a16="http://schemas.microsoft.com/office/drawing/2014/main" id="{2F09DA9B-B53A-1342-965D-8787DA2178D3}"/>
+              </a:ext>
+            </a:extLst>
+          </p:cNvPr>
+          <p:cNvSpPr>
+            <a:spLocks noGrp="1"/>
+          </p:cNvSpPr>
+          <p:nvPr>
+            <p:ph type="title"/>
+          </p:nvPr>
+        </p:nvSpPr>
+        <p:spPr/>
+        <p:txBody>
+          <a:bodyPr/>
+          <a:lstStyle/>
+          <a:p>
+            <a:r>
+              <a:rPr lang="fr-FR" dirty="0"/>
+              <a:t>3.2. Réalisation</a:t>
+            </a:r>
+          </a:p>
+        </p:txBody>
+      </p:sp>
+      <p:sp>
+        <p:nvSpPr>
+          <p:cNvPr id="3" name="Espace réservé du contenu 2">
+            <a:extLst>
+              <a:ext uri="{FF2B5EF4-FFF2-40B4-BE49-F238E27FC236}">
+                <a16:creationId xmlns:a16="http://schemas.microsoft.com/office/drawing/2014/main" id="{7BDE6CE4-6394-D04A-9C51-BBADA7A7E3A8}"/>
+              </a:ext>
+            </a:extLst>
+          </p:cNvPr>
+          <p:cNvSpPr>
+            <a:spLocks noGrp="1"/>
+          </p:cNvSpPr>
+          <p:nvPr>
+            <p:ph idx="1"/>
+          </p:nvPr>
+        </p:nvSpPr>
+        <p:spPr/>
+        <p:txBody>
+          <a:bodyPr/>
+          <a:lstStyle/>
+          <a:p>
+            <a:endParaRPr lang="fr-FR" dirty="0"/>
+          </a:p>
+        </p:txBody>
+      </p:sp>
+      <p:cxnSp>
+        <p:nvCxnSpPr>
+          <p:cNvPr id="4" name="Connecteur droit 3">
+            <a:extLst>
+              <a:ext uri="{FF2B5EF4-FFF2-40B4-BE49-F238E27FC236}">
+                <a16:creationId xmlns:a16="http://schemas.microsoft.com/office/drawing/2014/main" id="{0E7D5D45-A6E9-EF45-806A-6FF57B28D948}"/>
+              </a:ext>
+            </a:extLst>
+          </p:cNvPr>
+          <p:cNvCxnSpPr/>
+          <p:nvPr/>
+        </p:nvCxnSpPr>
+        <p:spPr>
+          <a:xfrm>
+            <a:off x="734291" y="1413164"/>
+            <a:ext cx="7781059" cy="0"/>
+          </a:xfrm>
+          <a:prstGeom prst="line">
+            <a:avLst/>
+          </a:prstGeom>
+          <a:ln w="25400">
+            <a:solidFill>
+              <a:schemeClr val="tx1"/>
+            </a:solidFill>
+          </a:ln>
+        </p:spPr>
+        <p:style>
+          <a:lnRef idx="1">
+            <a:schemeClr val="accent1"/>
+          </a:lnRef>
+          <a:fillRef idx="0">
+            <a:schemeClr val="accent1"/>
+          </a:fillRef>
+          <a:effectRef idx="0">
+            <a:schemeClr val="accent1"/>
+          </a:effectRef>
+          <a:fontRef idx="minor">
+            <a:schemeClr val="tx1"/>
+          </a:fontRef>
+        </p:style>
+      </p:cxnSp>
+    </p:spTree>
+    <p:extLst>
+      <p:ext uri="{BB962C8B-B14F-4D97-AF65-F5344CB8AC3E}">
+        <p14:creationId xmlns:p14="http://schemas.microsoft.com/office/powerpoint/2010/main" val="155312639"/>
+      </p:ext>
+    </p:extLst>
+  </p:cSld>
+  <p:clrMapOvr>
+    <a:masterClrMapping/>
+  </p:clrMapOvr>
+</p:sld>
+</file>
+
+<file path=ppt/slides/slide11.xml><?xml version="1.0" encoding="utf-8"?>
+<p:sld xmlns:a="http://schemas.openxmlformats.org/drawingml/2006/main" xmlns:r="http://schemas.openxmlformats.org/officeDocument/2006/relationships" xmlns:p="http://schemas.openxmlformats.org/presentationml/2006/main">
+  <p:cSld>
+    <p:spTree>
+      <p:nvGrpSpPr>
+        <p:cNvPr id="1" name=""/>
+        <p:cNvGrpSpPr/>
+        <p:nvPr/>
+      </p:nvGrpSpPr>
+      <p:grpSpPr>
+        <a:xfrm>
+          <a:off x="0" y="0"/>
+          <a:ext cx="0" cy="0"/>
+          <a:chOff x="0" y="0"/>
+          <a:chExt cx="0" cy="0"/>
+        </a:xfrm>
+      </p:grpSpPr>
+      <p:sp>
+        <p:nvSpPr>
+          <p:cNvPr id="2" name="Titre 1">
+            <a:extLst>
+              <a:ext uri="{FF2B5EF4-FFF2-40B4-BE49-F238E27FC236}">
+                <a16:creationId xmlns:a16="http://schemas.microsoft.com/office/drawing/2014/main" id="{CD82C05A-D730-F74C-AE23-B41C0A6C957A}"/>
+              </a:ext>
+            </a:extLst>
+          </p:cNvPr>
+          <p:cNvSpPr>
+            <a:spLocks noGrp="1"/>
+          </p:cNvSpPr>
+          <p:nvPr>
+            <p:ph type="title"/>
+          </p:nvPr>
+        </p:nvSpPr>
+        <p:spPr/>
+        <p:txBody>
+          <a:bodyPr/>
+          <a:lstStyle/>
+          <a:p>
+            <a:r>
+              <a:rPr lang="fr-FR" dirty="0"/>
+              <a:t>3.3. Gestion de projet</a:t>
+            </a:r>
+          </a:p>
+        </p:txBody>
+      </p:sp>
+      <p:sp>
+        <p:nvSpPr>
+          <p:cNvPr id="3" name="Espace réservé du contenu 2">
+            <a:extLst>
+              <a:ext uri="{FF2B5EF4-FFF2-40B4-BE49-F238E27FC236}">
+                <a16:creationId xmlns:a16="http://schemas.microsoft.com/office/drawing/2014/main" id="{302183B7-A0B7-9646-A790-9696281FD04F}"/>
+              </a:ext>
+            </a:extLst>
+          </p:cNvPr>
+          <p:cNvSpPr>
+            <a:spLocks noGrp="1"/>
+          </p:cNvSpPr>
+          <p:nvPr>
+            <p:ph idx="1"/>
+          </p:nvPr>
+        </p:nvSpPr>
+        <p:spPr/>
+        <p:txBody>
+          <a:bodyPr/>
+          <a:lstStyle/>
+          <a:p>
+            <a:endParaRPr lang="fr-FR"/>
+          </a:p>
+        </p:txBody>
+      </p:sp>
+      <p:cxnSp>
+        <p:nvCxnSpPr>
+          <p:cNvPr id="4" name="Connecteur droit 3">
+            <a:extLst>
+              <a:ext uri="{FF2B5EF4-FFF2-40B4-BE49-F238E27FC236}">
+                <a16:creationId xmlns:a16="http://schemas.microsoft.com/office/drawing/2014/main" id="{BF842066-4406-9F4B-869D-006DE761ABCA}"/>
+              </a:ext>
+            </a:extLst>
+          </p:cNvPr>
+          <p:cNvCxnSpPr/>
+          <p:nvPr/>
+        </p:nvCxnSpPr>
+        <p:spPr>
+          <a:xfrm>
+            <a:off x="734291" y="1413164"/>
+            <a:ext cx="7781059" cy="0"/>
+          </a:xfrm>
+          <a:prstGeom prst="line">
+            <a:avLst/>
+          </a:prstGeom>
+          <a:ln w="25400">
+            <a:solidFill>
+              <a:schemeClr val="tx1"/>
+            </a:solidFill>
+          </a:ln>
+        </p:spPr>
+        <p:style>
+          <a:lnRef idx="1">
+            <a:schemeClr val="accent1"/>
+          </a:lnRef>
+          <a:fillRef idx="0">
+            <a:schemeClr val="accent1"/>
+          </a:fillRef>
+          <a:effectRef idx="0">
+            <a:schemeClr val="accent1"/>
+          </a:effectRef>
+          <a:fontRef idx="minor">
+            <a:schemeClr val="tx1"/>
+          </a:fontRef>
+        </p:style>
+      </p:cxnSp>
+    </p:spTree>
+    <p:extLst>
+      <p:ext uri="{BB962C8B-B14F-4D97-AF65-F5344CB8AC3E}">
+        <p14:creationId xmlns:p14="http://schemas.microsoft.com/office/powerpoint/2010/main" val="208486163"/>
+      </p:ext>
+    </p:extLst>
+  </p:cSld>
+  <p:clrMapOvr>
+    <a:masterClrMapping/>
+  </p:clrMapOvr>
+</p:sld>
+</file>
+
+<file path=ppt/slides/slide12.xml><?xml version="1.0" encoding="utf-8"?>
+<p:sld xmlns:a="http://schemas.openxmlformats.org/drawingml/2006/main" xmlns:r="http://schemas.openxmlformats.org/officeDocument/2006/relationships" xmlns:p="http://schemas.openxmlformats.org/presentationml/2006/main">
+  <p:cSld>
+    <p:spTree>
+      <p:nvGrpSpPr>
+        <p:cNvPr id="1" name=""/>
+        <p:cNvGrpSpPr/>
+        <p:nvPr/>
+      </p:nvGrpSpPr>
+      <p:grpSpPr>
+        <a:xfrm>
+          <a:off x="0" y="0"/>
+          <a:ext cx="0" cy="0"/>
+          <a:chOff x="0" y="0"/>
+          <a:chExt cx="0" cy="0"/>
+        </a:xfrm>
+      </p:grpSpPr>
+      <p:sp>
+        <p:nvSpPr>
+          <p:cNvPr id="2" name="Titre 1">
+            <a:extLst>
+              <a:ext uri="{FF2B5EF4-FFF2-40B4-BE49-F238E27FC236}">
+                <a16:creationId xmlns:a16="http://schemas.microsoft.com/office/drawing/2014/main" id="{9A78FA2C-B70E-6A40-A936-CC6D0A774F06}"/>
+              </a:ext>
+            </a:extLst>
+          </p:cNvPr>
+          <p:cNvSpPr>
+            <a:spLocks noGrp="1"/>
+          </p:cNvSpPr>
+          <p:nvPr>
+            <p:ph type="title"/>
+          </p:nvPr>
+        </p:nvSpPr>
+        <p:spPr/>
+        <p:txBody>
+          <a:bodyPr/>
+          <a:lstStyle/>
+          <a:p>
+            <a:r>
+              <a:rPr lang="fr-FR" dirty="0"/>
+              <a:t>3.4. Retours d’expériences</a:t>
+            </a:r>
+          </a:p>
+        </p:txBody>
+      </p:sp>
+      <p:sp>
+        <p:nvSpPr>
+          <p:cNvPr id="3" name="Espace réservé du contenu 2">
+            <a:extLst>
+              <a:ext uri="{FF2B5EF4-FFF2-40B4-BE49-F238E27FC236}">
+                <a16:creationId xmlns:a16="http://schemas.microsoft.com/office/drawing/2014/main" id="{7FC9BC38-8350-1D4B-BB3D-7B23D016EC56}"/>
+              </a:ext>
+            </a:extLst>
+          </p:cNvPr>
+          <p:cNvSpPr>
+            <a:spLocks noGrp="1"/>
+          </p:cNvSpPr>
+          <p:nvPr>
+            <p:ph idx="1"/>
+          </p:nvPr>
+        </p:nvSpPr>
+        <p:spPr/>
+        <p:txBody>
+          <a:bodyPr/>
+          <a:lstStyle/>
+          <a:p>
+            <a:endParaRPr lang="fr-FR"/>
+          </a:p>
+        </p:txBody>
+      </p:sp>
+      <p:cxnSp>
+        <p:nvCxnSpPr>
+          <p:cNvPr id="4" name="Connecteur droit 3">
+            <a:extLst>
+              <a:ext uri="{FF2B5EF4-FFF2-40B4-BE49-F238E27FC236}">
+                <a16:creationId xmlns:a16="http://schemas.microsoft.com/office/drawing/2014/main" id="{96EDC23D-983D-B149-A77D-88F55A590288}"/>
+              </a:ext>
+            </a:extLst>
+          </p:cNvPr>
+          <p:cNvCxnSpPr/>
+          <p:nvPr/>
+        </p:nvCxnSpPr>
+        <p:spPr>
+          <a:xfrm>
+            <a:off x="734291" y="1413164"/>
+            <a:ext cx="7781059" cy="0"/>
+          </a:xfrm>
+          <a:prstGeom prst="line">
+            <a:avLst/>
+          </a:prstGeom>
+          <a:ln w="25400">
+            <a:solidFill>
+              <a:schemeClr val="tx1"/>
+            </a:solidFill>
+          </a:ln>
+        </p:spPr>
+        <p:style>
+          <a:lnRef idx="1">
+            <a:schemeClr val="accent1"/>
+          </a:lnRef>
+          <a:fillRef idx="0">
+            <a:schemeClr val="accent1"/>
+          </a:fillRef>
+          <a:effectRef idx="0">
+            <a:schemeClr val="accent1"/>
+          </a:effectRef>
+          <a:fontRef idx="minor">
+            <a:schemeClr val="tx1"/>
+          </a:fontRef>
+        </p:style>
+      </p:cxnSp>
+    </p:spTree>
+    <p:extLst>
+      <p:ext uri="{BB962C8B-B14F-4D97-AF65-F5344CB8AC3E}">
+        <p14:creationId xmlns:p14="http://schemas.microsoft.com/office/powerpoint/2010/main" val="1236490999"/>
+      </p:ext>
+    </p:extLst>
+  </p:cSld>
+  <p:clrMapOvr>
+    <a:masterClrMapping/>
+  </p:clrMapOvr>
+</p:sld>
+</file>
+
+<file path=ppt/slides/slide13.xml><?xml version="1.0" encoding="utf-8"?>
+<p:sld xmlns:a="http://schemas.openxmlformats.org/drawingml/2006/main" xmlns:r="http://schemas.openxmlformats.org/officeDocument/2006/relationships" xmlns:p="http://schemas.openxmlformats.org/presentationml/2006/main">
+  <p:cSld>
+    <p:spTree>
+      <p:nvGrpSpPr>
+        <p:cNvPr id="1" name=""/>
+        <p:cNvGrpSpPr/>
+        <p:nvPr/>
+      </p:nvGrpSpPr>
+      <p:grpSpPr>
+        <a:xfrm>
+          <a:off x="0" y="0"/>
+          <a:ext cx="0" cy="0"/>
+          <a:chOff x="0" y="0"/>
+          <a:chExt cx="0" cy="0"/>
+        </a:xfrm>
+      </p:grpSpPr>
+      <p:sp>
+        <p:nvSpPr>
+          <p:cNvPr id="2" name="Titre 1">
+            <a:extLst>
+              <a:ext uri="{FF2B5EF4-FFF2-40B4-BE49-F238E27FC236}">
+                <a16:creationId xmlns:a16="http://schemas.microsoft.com/office/drawing/2014/main" id="{3547CA27-913B-AA4B-9425-14979B2D63CA}"/>
+              </a:ext>
+            </a:extLst>
+          </p:cNvPr>
+          <p:cNvSpPr>
+            <a:spLocks noGrp="1"/>
+          </p:cNvSpPr>
+          <p:nvPr>
+            <p:ph type="title"/>
+          </p:nvPr>
+        </p:nvSpPr>
+        <p:spPr/>
+        <p:txBody>
+          <a:bodyPr/>
+          <a:lstStyle/>
+          <a:p>
+            <a:r>
+              <a:rPr lang="fr-FR" dirty="0"/>
+              <a:t>4. Bilan et retours d’expériences</a:t>
+            </a:r>
+          </a:p>
+        </p:txBody>
+      </p:sp>
+      <p:sp>
+        <p:nvSpPr>
+          <p:cNvPr id="3" name="Espace réservé du contenu 2">
+            <a:extLst>
+              <a:ext uri="{FF2B5EF4-FFF2-40B4-BE49-F238E27FC236}">
+                <a16:creationId xmlns:a16="http://schemas.microsoft.com/office/drawing/2014/main" id="{EC4AD80C-CAB8-DF4C-B5CB-98CE4197BD9F}"/>
+              </a:ext>
+            </a:extLst>
+          </p:cNvPr>
+          <p:cNvSpPr>
+            <a:spLocks noGrp="1"/>
+          </p:cNvSpPr>
+          <p:nvPr>
+            <p:ph idx="1"/>
+          </p:nvPr>
+        </p:nvSpPr>
+        <p:spPr/>
+        <p:txBody>
+          <a:bodyPr/>
+          <a:lstStyle/>
+          <a:p>
+            <a:endParaRPr lang="fr-FR" dirty="0"/>
+          </a:p>
+        </p:txBody>
+      </p:sp>
+      <p:cxnSp>
+        <p:nvCxnSpPr>
+          <p:cNvPr id="4" name="Connecteur droit 3">
+            <a:extLst>
+              <a:ext uri="{FF2B5EF4-FFF2-40B4-BE49-F238E27FC236}">
+                <a16:creationId xmlns:a16="http://schemas.microsoft.com/office/drawing/2014/main" id="{A297B4D4-844F-9545-B9F4-B94EDCF1F528}"/>
+              </a:ext>
+            </a:extLst>
+          </p:cNvPr>
+          <p:cNvCxnSpPr/>
+          <p:nvPr/>
+        </p:nvCxnSpPr>
+        <p:spPr>
+          <a:xfrm>
+            <a:off x="734291" y="1413164"/>
+            <a:ext cx="7781059" cy="0"/>
+          </a:xfrm>
+          <a:prstGeom prst="line">
+            <a:avLst/>
+          </a:prstGeom>
+          <a:ln w="25400">
+            <a:solidFill>
+              <a:schemeClr val="tx1"/>
+            </a:solidFill>
+          </a:ln>
+        </p:spPr>
+        <p:style>
+          <a:lnRef idx="1">
+            <a:schemeClr val="accent1"/>
+          </a:lnRef>
+          <a:fillRef idx="0">
+            <a:schemeClr val="accent1"/>
+          </a:fillRef>
+          <a:effectRef idx="0">
+            <a:schemeClr val="accent1"/>
+          </a:effectRef>
+          <a:fontRef idx="minor">
+            <a:schemeClr val="tx1"/>
+          </a:fontRef>
+        </p:style>
+      </p:cxnSp>
+    </p:spTree>
+    <p:extLst>
+      <p:ext uri="{BB962C8B-B14F-4D97-AF65-F5344CB8AC3E}">
+        <p14:creationId xmlns:p14="http://schemas.microsoft.com/office/powerpoint/2010/main" val="706941121"/>
+      </p:ext>
+    </p:extLst>
+  </p:cSld>
+  <p:clrMapOvr>
+    <a:masterClrMapping/>
+  </p:clrMapOvr>
+</p:sld>
+</file>
+
+<file path=ppt/slides/slide14.xml><?xml version="1.0" encoding="utf-8"?>
+<p:sld xmlns:a="http://schemas.openxmlformats.org/drawingml/2006/main" xmlns:r="http://schemas.openxmlformats.org/officeDocument/2006/relationships" xmlns:p="http://schemas.openxmlformats.org/presentationml/2006/main">
+  <p:cSld>
+    <p:spTree>
+      <p:nvGrpSpPr>
+        <p:cNvPr id="1" name=""/>
+        <p:cNvGrpSpPr/>
+        <p:nvPr/>
+      </p:nvGrpSpPr>
+      <p:grpSpPr>
+        <a:xfrm>
+          <a:off x="0" y="0"/>
+          <a:ext cx="0" cy="0"/>
+          <a:chOff x="0" y="0"/>
+          <a:chExt cx="0" cy="0"/>
+        </a:xfrm>
+      </p:grpSpPr>
+      <p:sp>
+        <p:nvSpPr>
+          <p:cNvPr id="2" name="Titre 1">
+            <a:extLst>
+              <a:ext uri="{FF2B5EF4-FFF2-40B4-BE49-F238E27FC236}">
+                <a16:creationId xmlns:a16="http://schemas.microsoft.com/office/drawing/2014/main" id="{8C61F81E-E4BB-E64E-81A2-356D37D9B356}"/>
+              </a:ext>
+            </a:extLst>
+          </p:cNvPr>
+          <p:cNvSpPr>
+            <a:spLocks noGrp="1"/>
+          </p:cNvSpPr>
+          <p:nvPr>
+            <p:ph type="title"/>
+          </p:nvPr>
+        </p:nvSpPr>
+        <p:spPr>
+          <a:xfrm>
+            <a:off x="0" y="2575536"/>
+            <a:ext cx="9144000" cy="1706928"/>
+          </a:xfrm>
+        </p:spPr>
+        <p:txBody>
+          <a:bodyPr>
+            <a:noAutofit/>
+          </a:bodyPr>
+          <a:lstStyle/>
+          <a:p>
+            <a:pPr algn="ctr"/>
+            <a:r>
+              <a:rPr lang="fr-FR" sz="5400" dirty="0"/>
+              <a:t>Merci pour votre attention</a:t>
+            </a:r>
+          </a:p>
+        </p:txBody>
+      </p:sp>
+    </p:spTree>
+    <p:extLst>
+      <p:ext uri="{BB962C8B-B14F-4D97-AF65-F5344CB8AC3E}">
+        <p14:creationId xmlns:p14="http://schemas.microsoft.com/office/powerpoint/2010/main" val="1596191630"/>
+      </p:ext>
+    </p:extLst>
+  </p:cSld>
+  <p:clrMapOvr>
+    <a:masterClrMapping/>
+  </p:clrMapOvr>
+</p:sld>
+</file>
+
+<file path=ppt/slides/slide15.xml><?xml version="1.0" encoding="utf-8"?>
+<p:sld xmlns:a="http://schemas.openxmlformats.org/drawingml/2006/main" xmlns:r="http://schemas.openxmlformats.org/officeDocument/2006/relationships" xmlns:p="http://schemas.openxmlformats.org/presentationml/2006/main">
+  <p:cSld>
+    <p:spTree>
+      <p:nvGrpSpPr>
+        <p:cNvPr id="1" name=""/>
+        <p:cNvGrpSpPr/>
+        <p:nvPr/>
+      </p:nvGrpSpPr>
+      <p:grpSpPr>
+        <a:xfrm>
+          <a:off x="0" y="0"/>
+          <a:ext cx="0" cy="0"/>
+          <a:chOff x="0" y="0"/>
+          <a:chExt cx="0" cy="0"/>
+        </a:xfrm>
+      </p:grpSpPr>
+      <p:sp>
+        <p:nvSpPr>
+          <p:cNvPr id="2" name="Titre 1">
+            <a:extLst>
+              <a:ext uri="{FF2B5EF4-FFF2-40B4-BE49-F238E27FC236}">
+                <a16:creationId xmlns:a16="http://schemas.microsoft.com/office/drawing/2014/main" id="{8C61F81E-E4BB-E64E-81A2-356D37D9B356}"/>
+              </a:ext>
+            </a:extLst>
+          </p:cNvPr>
+          <p:cNvSpPr>
+            <a:spLocks noGrp="1"/>
+          </p:cNvSpPr>
+          <p:nvPr>
+            <p:ph type="title"/>
+          </p:nvPr>
+        </p:nvSpPr>
+        <p:spPr>
+          <a:xfrm>
+            <a:off x="0" y="2575536"/>
+            <a:ext cx="9144000" cy="1706928"/>
+          </a:xfrm>
+        </p:spPr>
+        <p:txBody>
+          <a:bodyPr>
+            <a:noAutofit/>
+          </a:bodyPr>
+          <a:lstStyle/>
+          <a:p>
+            <a:pPr algn="ctr"/>
+            <a:r>
+              <a:rPr lang="fr-FR" sz="5400" dirty="0"/>
+              <a:t>Questions</a:t>
+            </a:r>
+          </a:p>
+        </p:txBody>
+      </p:sp>
+    </p:spTree>
+    <p:extLst>
+      <p:ext uri="{BB962C8B-B14F-4D97-AF65-F5344CB8AC3E}">
+        <p14:creationId xmlns:p14="http://schemas.microsoft.com/office/powerpoint/2010/main" val="2541000565"/>
       </p:ext>
     </p:extLst>
   </p:cSld>
@@ -3180,6 +5439,301 @@
       </p:grpSpPr>
       <p:sp>
         <p:nvSpPr>
+          <p:cNvPr id="3" name="Espace réservé du contenu 2">
+            <a:extLst>
+              <a:ext uri="{FF2B5EF4-FFF2-40B4-BE49-F238E27FC236}">
+                <a16:creationId xmlns:a16="http://schemas.microsoft.com/office/drawing/2014/main" id="{D396F537-C2CC-D24D-8137-530674FB43F8}"/>
+              </a:ext>
+            </a:extLst>
+          </p:cNvPr>
+          <p:cNvSpPr>
+            <a:spLocks noGrp="1"/>
+          </p:cNvSpPr>
+          <p:nvPr>
+            <p:ph idx="1"/>
+          </p:nvPr>
+        </p:nvSpPr>
+        <p:spPr>
+          <a:xfrm>
+            <a:off x="0" y="0"/>
+            <a:ext cx="9144000" cy="6858000"/>
+          </a:xfrm>
+        </p:spPr>
+        <p:txBody>
+          <a:bodyPr vert="horz">
+            <a:normAutofit/>
+          </a:bodyPr>
+          <a:lstStyle/>
+          <a:p>
+            <a:pPr marL="0" indent="0">
+              <a:lnSpc>
+                <a:spcPct val="100000"/>
+              </a:lnSpc>
+              <a:buNone/>
+            </a:pPr>
+            <a:r>
+              <a:rPr lang="fr-FR" sz="2600" dirty="0">
+                <a:latin typeface="SF UI Display Light" pitchFamily="2" charset="0"/>
+                <a:ea typeface="SF UI Display Light" pitchFamily="2" charset="0"/>
+              </a:rPr>
+              <a:t>1. Présentation</a:t>
+            </a:r>
+          </a:p>
+          <a:p>
+            <a:pPr marL="0" indent="0">
+              <a:lnSpc>
+                <a:spcPct val="100000"/>
+              </a:lnSpc>
+              <a:buNone/>
+            </a:pPr>
+            <a:r>
+              <a:rPr lang="fr-FR" sz="2600" dirty="0">
+                <a:latin typeface="SF UI Display Light" pitchFamily="2" charset="0"/>
+                <a:ea typeface="SF UI Display Light" pitchFamily="2" charset="0"/>
+              </a:rPr>
+              <a:t>2. Contexte et projets réalisés</a:t>
+            </a:r>
+          </a:p>
+          <a:p>
+            <a:pPr marL="0" indent="0">
+              <a:lnSpc>
+                <a:spcPct val="100000"/>
+              </a:lnSpc>
+              <a:buNone/>
+            </a:pPr>
+            <a:r>
+              <a:rPr lang="fr-FR" sz="2600" dirty="0">
+                <a:latin typeface="SF UI Display Light" pitchFamily="2" charset="0"/>
+                <a:ea typeface="SF UI Display Light" pitchFamily="2" charset="0"/>
+              </a:rPr>
+              <a:t>3. Projet : Migration et nouvelles fonctionnalités</a:t>
+            </a:r>
+          </a:p>
+          <a:p>
+            <a:pPr marL="457200" lvl="1" indent="0">
+              <a:lnSpc>
+                <a:spcPct val="100000"/>
+              </a:lnSpc>
+              <a:buNone/>
+            </a:pPr>
+            <a:r>
+              <a:rPr lang="fr-FR" sz="2200" dirty="0">
+                <a:latin typeface="SF UI Display Light" pitchFamily="2" charset="0"/>
+                <a:ea typeface="SF UI Display Light" pitchFamily="2" charset="0"/>
+              </a:rPr>
+              <a:t>3.1. Contexte et objectifs</a:t>
+            </a:r>
+          </a:p>
+          <a:p>
+            <a:pPr marL="457200" lvl="1" indent="0">
+              <a:lnSpc>
+                <a:spcPct val="100000"/>
+              </a:lnSpc>
+              <a:buNone/>
+            </a:pPr>
+            <a:r>
+              <a:rPr lang="fr-FR" sz="2200" dirty="0">
+                <a:latin typeface="SF UI Display Light" pitchFamily="2" charset="0"/>
+                <a:ea typeface="SF UI Display Light" pitchFamily="2" charset="0"/>
+              </a:rPr>
+              <a:t>3.2. Recrutement de compétences</a:t>
+            </a:r>
+          </a:p>
+          <a:p>
+            <a:pPr marL="457200" lvl="1" indent="0">
+              <a:lnSpc>
+                <a:spcPct val="100000"/>
+              </a:lnSpc>
+              <a:buNone/>
+            </a:pPr>
+            <a:r>
+              <a:rPr lang="fr-FR" sz="2200" dirty="0">
+                <a:latin typeface="SF UI Display Light" pitchFamily="2" charset="0"/>
+                <a:ea typeface="SF UI Display Light" pitchFamily="2" charset="0"/>
+              </a:rPr>
+              <a:t>3.2. Spécifications</a:t>
+            </a:r>
+          </a:p>
+          <a:p>
+            <a:pPr marL="457200" lvl="1" indent="0">
+              <a:lnSpc>
+                <a:spcPct val="100000"/>
+              </a:lnSpc>
+              <a:buNone/>
+            </a:pPr>
+            <a:r>
+              <a:rPr lang="fr-FR" sz="2200" dirty="0">
+                <a:latin typeface="SF UI Display Light" pitchFamily="2" charset="0"/>
+                <a:ea typeface="SF UI Display Light" pitchFamily="2" charset="0"/>
+              </a:rPr>
+              <a:t>3.3. Planning et roadmap</a:t>
+            </a:r>
+          </a:p>
+          <a:p>
+            <a:pPr marL="457200" lvl="1" indent="0">
+              <a:lnSpc>
+                <a:spcPct val="100000"/>
+              </a:lnSpc>
+              <a:buNone/>
+            </a:pPr>
+            <a:r>
+              <a:rPr lang="fr-FR" sz="2200" dirty="0">
+                <a:latin typeface="SF UI Display Light" pitchFamily="2" charset="0"/>
+                <a:ea typeface="SF UI Display Light" pitchFamily="2" charset="0"/>
+              </a:rPr>
+              <a:t>3.3. Gestion de projet agile</a:t>
+            </a:r>
+          </a:p>
+          <a:p>
+            <a:pPr marL="457200" lvl="1" indent="0">
+              <a:lnSpc>
+                <a:spcPct val="100000"/>
+              </a:lnSpc>
+              <a:buNone/>
+            </a:pPr>
+            <a:r>
+              <a:rPr lang="fr-FR" sz="2200" dirty="0">
+                <a:latin typeface="SF UI Display Light" pitchFamily="2" charset="0"/>
+                <a:ea typeface="SF UI Display Light" pitchFamily="2" charset="0"/>
+              </a:rPr>
+              <a:t>3.3. Architecture</a:t>
+            </a:r>
+          </a:p>
+          <a:p>
+            <a:pPr marL="457200" lvl="1" indent="0">
+              <a:lnSpc>
+                <a:spcPct val="100000"/>
+              </a:lnSpc>
+              <a:buNone/>
+            </a:pPr>
+            <a:r>
+              <a:rPr lang="fr-FR" sz="2200" dirty="0">
+                <a:latin typeface="SF UI Display Light" pitchFamily="2" charset="0"/>
+                <a:ea typeface="SF UI Display Light" pitchFamily="2" charset="0"/>
+              </a:rPr>
+              <a:t>3.4. Environnement</a:t>
+            </a:r>
+          </a:p>
+          <a:p>
+            <a:pPr marL="457200" lvl="1" indent="0">
+              <a:lnSpc>
+                <a:spcPct val="100000"/>
+              </a:lnSpc>
+              <a:buNone/>
+            </a:pPr>
+            <a:r>
+              <a:rPr lang="fr-FR" sz="2200" dirty="0">
+                <a:latin typeface="SF UI Display Light" pitchFamily="2" charset="0"/>
+                <a:ea typeface="SF UI Display Light" pitchFamily="2" charset="0"/>
+              </a:rPr>
+              <a:t>3.2. </a:t>
+            </a:r>
+            <a:r>
+              <a:rPr lang="fr-FR" sz="2200">
+                <a:latin typeface="SF UI Display Light" pitchFamily="2" charset="0"/>
+                <a:ea typeface="SF UI Display Light" pitchFamily="2" charset="0"/>
+              </a:rPr>
+              <a:t>Réalisation</a:t>
+            </a:r>
+            <a:endParaRPr lang="fr-FR" sz="2200" dirty="0">
+              <a:latin typeface="SF UI Display Light" pitchFamily="2" charset="0"/>
+              <a:ea typeface="SF UI Display Light" pitchFamily="2" charset="0"/>
+            </a:endParaRPr>
+          </a:p>
+          <a:p>
+            <a:pPr marL="457200" lvl="1" indent="0">
+              <a:lnSpc>
+                <a:spcPct val="100000"/>
+              </a:lnSpc>
+              <a:buNone/>
+            </a:pPr>
+            <a:r>
+              <a:rPr lang="fr-FR" sz="2200" dirty="0">
+                <a:latin typeface="SF UI Display Light" pitchFamily="2" charset="0"/>
+                <a:ea typeface="SF UI Display Light" pitchFamily="2" charset="0"/>
+              </a:rPr>
+              <a:t>3.4. RGPD</a:t>
+            </a:r>
+          </a:p>
+          <a:p>
+            <a:pPr marL="457200" lvl="1" indent="0">
+              <a:lnSpc>
+                <a:spcPct val="100000"/>
+              </a:lnSpc>
+              <a:buNone/>
+            </a:pPr>
+            <a:r>
+              <a:rPr lang="fr-FR" sz="2200" dirty="0">
+                <a:latin typeface="SF UI Display Light" pitchFamily="2" charset="0"/>
+                <a:ea typeface="SF UI Display Light" pitchFamily="2" charset="0"/>
+              </a:rPr>
+              <a:t>3.5. Résultats et KPI</a:t>
+            </a:r>
+          </a:p>
+          <a:p>
+            <a:pPr marL="457200" lvl="1" indent="0">
+              <a:lnSpc>
+                <a:spcPct val="100000"/>
+              </a:lnSpc>
+              <a:buNone/>
+            </a:pPr>
+            <a:r>
+              <a:rPr lang="fr-FR" sz="2200" dirty="0">
+                <a:latin typeface="SF UI Display Light" pitchFamily="2" charset="0"/>
+                <a:ea typeface="SF UI Display Light" pitchFamily="2" charset="0"/>
+              </a:rPr>
+              <a:t>3.6. Bilan</a:t>
+            </a:r>
+          </a:p>
+          <a:p>
+            <a:pPr marL="0" indent="0">
+              <a:lnSpc>
+                <a:spcPct val="100000"/>
+              </a:lnSpc>
+              <a:buNone/>
+            </a:pPr>
+            <a:r>
+              <a:rPr lang="fr-FR" sz="2600" dirty="0">
+                <a:latin typeface="SF UI Display Light" pitchFamily="2" charset="0"/>
+                <a:ea typeface="SF UI Display Light" pitchFamily="2" charset="0"/>
+              </a:rPr>
+              <a:t>4. Bilan et retours d’expériences</a:t>
+            </a:r>
+          </a:p>
+        </p:txBody>
+      </p:sp>
+    </p:spTree>
+    <p:extLst>
+      <p:ext uri="{BB962C8B-B14F-4D97-AF65-F5344CB8AC3E}">
+        <p14:creationId xmlns:p14="http://schemas.microsoft.com/office/powerpoint/2010/main" val="1602780862"/>
+      </p:ext>
+    </p:extLst>
+  </p:cSld>
+  <p:clrMapOvr>
+    <a:masterClrMapping/>
+  </p:clrMapOvr>
+</p:sld>
+</file>
+
+<file path=ppt/slides/slide3.xml><?xml version="1.0" encoding="utf-8"?>
+<p:sld xmlns:a="http://schemas.openxmlformats.org/drawingml/2006/main" xmlns:r="http://schemas.openxmlformats.org/officeDocument/2006/relationships" xmlns:p="http://schemas.openxmlformats.org/presentationml/2006/main">
+  <p:cSld>
+    <p:spTree>
+      <p:nvGrpSpPr>
+        <p:cNvPr id="1" name=""/>
+        <p:cNvGrpSpPr/>
+        <p:nvPr/>
+      </p:nvGrpSpPr>
+      <p:grpSpPr>
+        <a:xfrm>
+          <a:off x="0" y="0"/>
+          <a:ext cx="0" cy="0"/>
+          <a:chOff x="0" y="0"/>
+          <a:chExt cx="0" cy="0"/>
+        </a:xfrm>
+      </p:grpSpPr>
+      <p:sp>
+        <p:nvSpPr>
           <p:cNvPr id="2" name="Titre 1">
             <a:extLst>
               <a:ext uri="{FF2B5EF4-FFF2-40B4-BE49-F238E27FC236}">
@@ -3199,7 +5753,13 @@
           <a:bodyPr/>
           <a:lstStyle/>
           <a:p>
-            <a:endParaRPr lang="fr-FR" dirty="0"/>
+            <a:r>
+              <a:rPr lang="fr-FR" dirty="0">
+                <a:latin typeface="SF UI Display" pitchFamily="2" charset="0"/>
+                <a:ea typeface="SF UI Display" pitchFamily="2" charset="0"/>
+              </a:rPr>
+              <a:t>Sommaire</a:t>
+            </a:r>
           </a:p>
         </p:txBody>
       </p:sp>
@@ -3219,19 +5779,841 @@
             <p:ph idx="1"/>
           </p:nvPr>
         </p:nvSpPr>
-        <p:spPr/>
-        <p:txBody>
-          <a:bodyPr/>
-          <a:lstStyle/>
-          <a:p>
-            <a:endParaRPr lang="fr-FR" dirty="0"/>
-          </a:p>
-        </p:txBody>
-      </p:sp>
+        <p:spPr>
+          <a:xfrm>
+            <a:off x="628650" y="1690690"/>
+            <a:ext cx="7886700" cy="5167310"/>
+          </a:xfrm>
+        </p:spPr>
+        <p:txBody>
+          <a:bodyPr vert="horz">
+            <a:normAutofit/>
+          </a:bodyPr>
+          <a:lstStyle/>
+          <a:p>
+            <a:pPr marL="0" indent="0">
+              <a:lnSpc>
+                <a:spcPct val="120000"/>
+              </a:lnSpc>
+              <a:buNone/>
+            </a:pPr>
+            <a:endParaRPr lang="fr-FR" sz="2600" dirty="0">
+              <a:solidFill>
+                <a:srgbClr val="000000"/>
+              </a:solidFill>
+              <a:latin typeface="Calibri Light" panose="020F0302020204030204" pitchFamily="34" charset="0"/>
+            </a:endParaRPr>
+          </a:p>
+        </p:txBody>
+      </p:sp>
+      <p:cxnSp>
+        <p:nvCxnSpPr>
+          <p:cNvPr id="5" name="Connecteur droit 4">
+            <a:extLst>
+              <a:ext uri="{FF2B5EF4-FFF2-40B4-BE49-F238E27FC236}">
+                <a16:creationId xmlns:a16="http://schemas.microsoft.com/office/drawing/2014/main" id="{741CBE1E-BA97-444A-8E0D-D12209897515}"/>
+              </a:ext>
+            </a:extLst>
+          </p:cNvPr>
+          <p:cNvCxnSpPr/>
+          <p:nvPr/>
+        </p:nvCxnSpPr>
+        <p:spPr>
+          <a:xfrm>
+            <a:off x="734291" y="1413164"/>
+            <a:ext cx="7781059" cy="0"/>
+          </a:xfrm>
+          <a:prstGeom prst="line">
+            <a:avLst/>
+          </a:prstGeom>
+          <a:ln w="25400">
+            <a:solidFill>
+              <a:schemeClr val="tx1"/>
+            </a:solidFill>
+          </a:ln>
+        </p:spPr>
+        <p:style>
+          <a:lnRef idx="1">
+            <a:schemeClr val="accent1"/>
+          </a:lnRef>
+          <a:fillRef idx="0">
+            <a:schemeClr val="accent1"/>
+          </a:fillRef>
+          <a:effectRef idx="0">
+            <a:schemeClr val="accent1"/>
+          </a:effectRef>
+          <a:fontRef idx="minor">
+            <a:schemeClr val="tx1"/>
+          </a:fontRef>
+        </p:style>
+      </p:cxnSp>
+    </p:spTree>
+    <p:extLst>
+      <p:ext uri="{BB962C8B-B14F-4D97-AF65-F5344CB8AC3E}">
+        <p14:creationId xmlns:p14="http://schemas.microsoft.com/office/powerpoint/2010/main" val="2229066176"/>
+      </p:ext>
+    </p:extLst>
+  </p:cSld>
+  <p:clrMapOvr>
+    <a:masterClrMapping/>
+  </p:clrMapOvr>
+</p:sld>
+</file>
+
+<file path=ppt/slides/slide4.xml><?xml version="1.0" encoding="utf-8"?>
+<p:sld xmlns:a="http://schemas.openxmlformats.org/drawingml/2006/main" xmlns:r="http://schemas.openxmlformats.org/officeDocument/2006/relationships" xmlns:p="http://schemas.openxmlformats.org/presentationml/2006/main">
+  <p:cSld>
+    <p:spTree>
+      <p:nvGrpSpPr>
+        <p:cNvPr id="1" name=""/>
+        <p:cNvGrpSpPr/>
+        <p:nvPr/>
+      </p:nvGrpSpPr>
+      <p:grpSpPr>
+        <a:xfrm>
+          <a:off x="0" y="0"/>
+          <a:ext cx="0" cy="0"/>
+          <a:chOff x="0" y="0"/>
+          <a:chExt cx="0" cy="0"/>
+        </a:xfrm>
+      </p:grpSpPr>
+      <p:sp>
+        <p:nvSpPr>
+          <p:cNvPr id="2" name="Titre 1">
+            <a:extLst>
+              <a:ext uri="{FF2B5EF4-FFF2-40B4-BE49-F238E27FC236}">
+                <a16:creationId xmlns:a16="http://schemas.microsoft.com/office/drawing/2014/main" id="{08A3C30D-ADA7-8E4B-BA63-C4C4127F92AB}"/>
+              </a:ext>
+            </a:extLst>
+          </p:cNvPr>
+          <p:cNvSpPr>
+            <a:spLocks noGrp="1"/>
+          </p:cNvSpPr>
+          <p:nvPr>
+            <p:ph type="title"/>
+          </p:nvPr>
+        </p:nvSpPr>
+        <p:spPr/>
+        <p:txBody>
+          <a:bodyPr/>
+          <a:lstStyle/>
+          <a:p>
+            <a:r>
+              <a:rPr lang="fr-FR" dirty="0">
+                <a:latin typeface="SF UI Display Light" pitchFamily="2" charset="0"/>
+                <a:ea typeface="SF UI Display Light" pitchFamily="2" charset="0"/>
+              </a:rPr>
+              <a:t>Sommaire</a:t>
+            </a:r>
+          </a:p>
+        </p:txBody>
+      </p:sp>
+      <p:sp>
+        <p:nvSpPr>
+          <p:cNvPr id="3" name="Espace réservé du contenu 2">
+            <a:extLst>
+              <a:ext uri="{FF2B5EF4-FFF2-40B4-BE49-F238E27FC236}">
+                <a16:creationId xmlns:a16="http://schemas.microsoft.com/office/drawing/2014/main" id="{D396F537-C2CC-D24D-8137-530674FB43F8}"/>
+              </a:ext>
+            </a:extLst>
+          </p:cNvPr>
+          <p:cNvSpPr>
+            <a:spLocks noGrp="1"/>
+          </p:cNvSpPr>
+          <p:nvPr>
+            <p:ph idx="1"/>
+          </p:nvPr>
+        </p:nvSpPr>
+        <p:spPr>
+          <a:xfrm>
+            <a:off x="628650" y="1690690"/>
+            <a:ext cx="7886700" cy="5167310"/>
+          </a:xfrm>
+        </p:spPr>
+        <p:txBody>
+          <a:bodyPr vert="horz">
+            <a:normAutofit/>
+          </a:bodyPr>
+          <a:lstStyle/>
+          <a:p>
+            <a:pPr marL="0" indent="0">
+              <a:lnSpc>
+                <a:spcPct val="100000"/>
+              </a:lnSpc>
+              <a:buNone/>
+            </a:pPr>
+            <a:r>
+              <a:rPr lang="fr-FR" sz="2600" dirty="0">
+                <a:solidFill>
+                  <a:srgbClr val="000000"/>
+                </a:solidFill>
+                <a:latin typeface="SF UI Display Light" pitchFamily="2" charset="0"/>
+                <a:ea typeface="SF UI Display Light" pitchFamily="2" charset="0"/>
+              </a:rPr>
+              <a:t>1. Présentation</a:t>
+            </a:r>
+          </a:p>
+        </p:txBody>
+      </p:sp>
+      <p:cxnSp>
+        <p:nvCxnSpPr>
+          <p:cNvPr id="5" name="Connecteur droit 4">
+            <a:extLst>
+              <a:ext uri="{FF2B5EF4-FFF2-40B4-BE49-F238E27FC236}">
+                <a16:creationId xmlns:a16="http://schemas.microsoft.com/office/drawing/2014/main" id="{741CBE1E-BA97-444A-8E0D-D12209897515}"/>
+              </a:ext>
+            </a:extLst>
+          </p:cNvPr>
+          <p:cNvCxnSpPr/>
+          <p:nvPr/>
+        </p:nvCxnSpPr>
+        <p:spPr>
+          <a:xfrm>
+            <a:off x="734291" y="1413164"/>
+            <a:ext cx="7781059" cy="0"/>
+          </a:xfrm>
+          <a:prstGeom prst="line">
+            <a:avLst/>
+          </a:prstGeom>
+          <a:ln w="25400">
+            <a:solidFill>
+              <a:schemeClr val="tx1"/>
+            </a:solidFill>
+          </a:ln>
+        </p:spPr>
+        <p:style>
+          <a:lnRef idx="1">
+            <a:schemeClr val="accent1"/>
+          </a:lnRef>
+          <a:fillRef idx="0">
+            <a:schemeClr val="accent1"/>
+          </a:fillRef>
+          <a:effectRef idx="0">
+            <a:schemeClr val="accent1"/>
+          </a:effectRef>
+          <a:fontRef idx="minor">
+            <a:schemeClr val="tx1"/>
+          </a:fontRef>
+        </p:style>
+      </p:cxnSp>
     </p:spTree>
     <p:extLst>
       <p:ext uri="{BB962C8B-B14F-4D97-AF65-F5344CB8AC3E}">
         <p14:creationId xmlns:p14="http://schemas.microsoft.com/office/powerpoint/2010/main" val="3553397384"/>
+      </p:ext>
+    </p:extLst>
+  </p:cSld>
+  <p:clrMapOvr>
+    <a:masterClrMapping/>
+  </p:clrMapOvr>
+</p:sld>
+</file>
+
+<file path=ppt/slides/slide5.xml><?xml version="1.0" encoding="utf-8"?>
+<p:sld xmlns:a="http://schemas.openxmlformats.org/drawingml/2006/main" xmlns:r="http://schemas.openxmlformats.org/officeDocument/2006/relationships" xmlns:p="http://schemas.openxmlformats.org/presentationml/2006/main">
+  <p:cSld>
+    <p:spTree>
+      <p:nvGrpSpPr>
+        <p:cNvPr id="1" name=""/>
+        <p:cNvGrpSpPr/>
+        <p:nvPr/>
+      </p:nvGrpSpPr>
+      <p:grpSpPr>
+        <a:xfrm>
+          <a:off x="0" y="0"/>
+          <a:ext cx="0" cy="0"/>
+          <a:chOff x="0" y="0"/>
+          <a:chExt cx="0" cy="0"/>
+        </a:xfrm>
+      </p:grpSpPr>
+      <p:sp>
+        <p:nvSpPr>
+          <p:cNvPr id="2" name="Titre 1">
+            <a:extLst>
+              <a:ext uri="{FF2B5EF4-FFF2-40B4-BE49-F238E27FC236}">
+                <a16:creationId xmlns:a16="http://schemas.microsoft.com/office/drawing/2014/main" id="{08A3C30D-ADA7-8E4B-BA63-C4C4127F92AB}"/>
+              </a:ext>
+            </a:extLst>
+          </p:cNvPr>
+          <p:cNvSpPr>
+            <a:spLocks noGrp="1"/>
+          </p:cNvSpPr>
+          <p:nvPr>
+            <p:ph type="title"/>
+          </p:nvPr>
+        </p:nvSpPr>
+        <p:spPr/>
+        <p:txBody>
+          <a:bodyPr/>
+          <a:lstStyle/>
+          <a:p>
+            <a:r>
+              <a:rPr lang="fr-FR" dirty="0">
+                <a:latin typeface="SF UI Display Light" pitchFamily="2" charset="0"/>
+                <a:ea typeface="SF UI Display Light" pitchFamily="2" charset="0"/>
+              </a:rPr>
+              <a:t>Sommaire</a:t>
+            </a:r>
+          </a:p>
+        </p:txBody>
+      </p:sp>
+      <p:sp>
+        <p:nvSpPr>
+          <p:cNvPr id="3" name="Espace réservé du contenu 2">
+            <a:extLst>
+              <a:ext uri="{FF2B5EF4-FFF2-40B4-BE49-F238E27FC236}">
+                <a16:creationId xmlns:a16="http://schemas.microsoft.com/office/drawing/2014/main" id="{D396F537-C2CC-D24D-8137-530674FB43F8}"/>
+              </a:ext>
+            </a:extLst>
+          </p:cNvPr>
+          <p:cNvSpPr>
+            <a:spLocks noGrp="1"/>
+          </p:cNvSpPr>
+          <p:nvPr>
+            <p:ph idx="1"/>
+          </p:nvPr>
+        </p:nvSpPr>
+        <p:spPr>
+          <a:xfrm>
+            <a:off x="628650" y="1690690"/>
+            <a:ext cx="7886700" cy="5167310"/>
+          </a:xfrm>
+        </p:spPr>
+        <p:txBody>
+          <a:bodyPr vert="horz">
+            <a:normAutofit/>
+          </a:bodyPr>
+          <a:lstStyle/>
+          <a:p>
+            <a:pPr marL="0" indent="0">
+              <a:lnSpc>
+                <a:spcPct val="100000"/>
+              </a:lnSpc>
+              <a:buNone/>
+            </a:pPr>
+            <a:r>
+              <a:rPr lang="fr-FR" sz="2600" dirty="0">
+                <a:solidFill>
+                  <a:schemeClr val="bg1">
+                    <a:lumMod val="65000"/>
+                  </a:schemeClr>
+                </a:solidFill>
+                <a:latin typeface="SF UI Display Light" pitchFamily="2" charset="0"/>
+                <a:ea typeface="SF UI Display Light" pitchFamily="2" charset="0"/>
+              </a:rPr>
+              <a:t>1. Présentation</a:t>
+            </a:r>
+          </a:p>
+          <a:p>
+            <a:pPr marL="0" indent="0">
+              <a:lnSpc>
+                <a:spcPct val="100000"/>
+              </a:lnSpc>
+              <a:buNone/>
+            </a:pPr>
+            <a:r>
+              <a:rPr lang="fr-FR" sz="2600" dirty="0">
+                <a:solidFill>
+                  <a:srgbClr val="000000"/>
+                </a:solidFill>
+                <a:latin typeface="SF UI Display Light" pitchFamily="2" charset="0"/>
+                <a:ea typeface="SF UI Display Light" pitchFamily="2" charset="0"/>
+              </a:rPr>
+              <a:t>2. Contexte et projets réalisés</a:t>
+            </a:r>
+            <a:endParaRPr lang="fr-FR" dirty="0">
+              <a:solidFill>
+                <a:srgbClr val="000000"/>
+              </a:solidFill>
+              <a:latin typeface="SF UI Display Light" pitchFamily="2" charset="0"/>
+              <a:ea typeface="SF UI Display Light" pitchFamily="2" charset="0"/>
+            </a:endParaRPr>
+          </a:p>
+        </p:txBody>
+      </p:sp>
+      <p:cxnSp>
+        <p:nvCxnSpPr>
+          <p:cNvPr id="5" name="Connecteur droit 4">
+            <a:extLst>
+              <a:ext uri="{FF2B5EF4-FFF2-40B4-BE49-F238E27FC236}">
+                <a16:creationId xmlns:a16="http://schemas.microsoft.com/office/drawing/2014/main" id="{741CBE1E-BA97-444A-8E0D-D12209897515}"/>
+              </a:ext>
+            </a:extLst>
+          </p:cNvPr>
+          <p:cNvCxnSpPr/>
+          <p:nvPr/>
+        </p:nvCxnSpPr>
+        <p:spPr>
+          <a:xfrm>
+            <a:off x="734291" y="1413164"/>
+            <a:ext cx="7781059" cy="0"/>
+          </a:xfrm>
+          <a:prstGeom prst="line">
+            <a:avLst/>
+          </a:prstGeom>
+          <a:ln w="25400">
+            <a:solidFill>
+              <a:schemeClr val="tx1"/>
+            </a:solidFill>
+          </a:ln>
+        </p:spPr>
+        <p:style>
+          <a:lnRef idx="1">
+            <a:schemeClr val="accent1"/>
+          </a:lnRef>
+          <a:fillRef idx="0">
+            <a:schemeClr val="accent1"/>
+          </a:fillRef>
+          <a:effectRef idx="0">
+            <a:schemeClr val="accent1"/>
+          </a:effectRef>
+          <a:fontRef idx="minor">
+            <a:schemeClr val="tx1"/>
+          </a:fontRef>
+        </p:style>
+      </p:cxnSp>
+    </p:spTree>
+    <p:extLst>
+      <p:ext uri="{BB962C8B-B14F-4D97-AF65-F5344CB8AC3E}">
+        <p14:creationId xmlns:p14="http://schemas.microsoft.com/office/powerpoint/2010/main" val="3980167408"/>
+      </p:ext>
+    </p:extLst>
+  </p:cSld>
+  <p:clrMapOvr>
+    <a:masterClrMapping/>
+  </p:clrMapOvr>
+</p:sld>
+</file>
+
+<file path=ppt/slides/slide6.xml><?xml version="1.0" encoding="utf-8"?>
+<p:sld xmlns:a="http://schemas.openxmlformats.org/drawingml/2006/main" xmlns:r="http://schemas.openxmlformats.org/officeDocument/2006/relationships" xmlns:p="http://schemas.openxmlformats.org/presentationml/2006/main">
+  <p:cSld>
+    <p:spTree>
+      <p:nvGrpSpPr>
+        <p:cNvPr id="1" name=""/>
+        <p:cNvGrpSpPr/>
+        <p:nvPr/>
+      </p:nvGrpSpPr>
+      <p:grpSpPr>
+        <a:xfrm>
+          <a:off x="0" y="0"/>
+          <a:ext cx="0" cy="0"/>
+          <a:chOff x="0" y="0"/>
+          <a:chExt cx="0" cy="0"/>
+        </a:xfrm>
+      </p:grpSpPr>
+      <p:sp>
+        <p:nvSpPr>
+          <p:cNvPr id="2" name="Titre 1">
+            <a:extLst>
+              <a:ext uri="{FF2B5EF4-FFF2-40B4-BE49-F238E27FC236}">
+                <a16:creationId xmlns:a16="http://schemas.microsoft.com/office/drawing/2014/main" id="{44A2B025-8D00-354A-926D-B4FE7AE50958}"/>
+              </a:ext>
+            </a:extLst>
+          </p:cNvPr>
+          <p:cNvSpPr>
+            <a:spLocks noGrp="1"/>
+          </p:cNvSpPr>
+          <p:nvPr>
+            <p:ph type="title"/>
+          </p:nvPr>
+        </p:nvSpPr>
+        <p:spPr/>
+        <p:txBody>
+          <a:bodyPr/>
+          <a:lstStyle/>
+          <a:p>
+            <a:r>
+              <a:rPr lang="fr-FR" dirty="0"/>
+              <a:t>1. Présentation</a:t>
+            </a:r>
+          </a:p>
+        </p:txBody>
+      </p:sp>
+      <p:sp>
+        <p:nvSpPr>
+          <p:cNvPr id="3" name="Espace réservé du contenu 2">
+            <a:extLst>
+              <a:ext uri="{FF2B5EF4-FFF2-40B4-BE49-F238E27FC236}">
+                <a16:creationId xmlns:a16="http://schemas.microsoft.com/office/drawing/2014/main" id="{11C5D3ED-29CD-B149-9A27-04F58E75EADB}"/>
+              </a:ext>
+            </a:extLst>
+          </p:cNvPr>
+          <p:cNvSpPr>
+            <a:spLocks noGrp="1"/>
+          </p:cNvSpPr>
+          <p:nvPr>
+            <p:ph idx="1"/>
+          </p:nvPr>
+        </p:nvSpPr>
+        <p:spPr/>
+        <p:txBody>
+          <a:bodyPr/>
+          <a:lstStyle/>
+          <a:p>
+            <a:endParaRPr lang="fr-FR"/>
+          </a:p>
+        </p:txBody>
+      </p:sp>
+      <p:cxnSp>
+        <p:nvCxnSpPr>
+          <p:cNvPr id="4" name="Connecteur droit 3">
+            <a:extLst>
+              <a:ext uri="{FF2B5EF4-FFF2-40B4-BE49-F238E27FC236}">
+                <a16:creationId xmlns:a16="http://schemas.microsoft.com/office/drawing/2014/main" id="{21D3B9D3-A937-804F-A9AD-0F66B0CD6B07}"/>
+              </a:ext>
+            </a:extLst>
+          </p:cNvPr>
+          <p:cNvCxnSpPr/>
+          <p:nvPr/>
+        </p:nvCxnSpPr>
+        <p:spPr>
+          <a:xfrm>
+            <a:off x="734291" y="1413164"/>
+            <a:ext cx="7781059" cy="0"/>
+          </a:xfrm>
+          <a:prstGeom prst="line">
+            <a:avLst/>
+          </a:prstGeom>
+          <a:ln w="25400">
+            <a:solidFill>
+              <a:schemeClr val="tx1"/>
+            </a:solidFill>
+          </a:ln>
+        </p:spPr>
+        <p:style>
+          <a:lnRef idx="1">
+            <a:schemeClr val="accent1"/>
+          </a:lnRef>
+          <a:fillRef idx="0">
+            <a:schemeClr val="accent1"/>
+          </a:fillRef>
+          <a:effectRef idx="0">
+            <a:schemeClr val="accent1"/>
+          </a:effectRef>
+          <a:fontRef idx="minor">
+            <a:schemeClr val="tx1"/>
+          </a:fontRef>
+        </p:style>
+      </p:cxnSp>
+    </p:spTree>
+    <p:extLst>
+      <p:ext uri="{BB962C8B-B14F-4D97-AF65-F5344CB8AC3E}">
+        <p14:creationId xmlns:p14="http://schemas.microsoft.com/office/powerpoint/2010/main" val="512122849"/>
+      </p:ext>
+    </p:extLst>
+  </p:cSld>
+  <p:clrMapOvr>
+    <a:masterClrMapping/>
+  </p:clrMapOvr>
+</p:sld>
+</file>
+
+<file path=ppt/slides/slide7.xml><?xml version="1.0" encoding="utf-8"?>
+<p:sld xmlns:a="http://schemas.openxmlformats.org/drawingml/2006/main" xmlns:r="http://schemas.openxmlformats.org/officeDocument/2006/relationships" xmlns:p="http://schemas.openxmlformats.org/presentationml/2006/main">
+  <p:cSld>
+    <p:spTree>
+      <p:nvGrpSpPr>
+        <p:cNvPr id="1" name=""/>
+        <p:cNvGrpSpPr/>
+        <p:nvPr/>
+      </p:nvGrpSpPr>
+      <p:grpSpPr>
+        <a:xfrm>
+          <a:off x="0" y="0"/>
+          <a:ext cx="0" cy="0"/>
+          <a:chOff x="0" y="0"/>
+          <a:chExt cx="0" cy="0"/>
+        </a:xfrm>
+      </p:grpSpPr>
+      <p:sp>
+        <p:nvSpPr>
+          <p:cNvPr id="2" name="Titre 1">
+            <a:extLst>
+              <a:ext uri="{FF2B5EF4-FFF2-40B4-BE49-F238E27FC236}">
+                <a16:creationId xmlns:a16="http://schemas.microsoft.com/office/drawing/2014/main" id="{E7F96D22-A3D0-B64D-8570-A60CD723A821}"/>
+              </a:ext>
+            </a:extLst>
+          </p:cNvPr>
+          <p:cNvSpPr>
+            <a:spLocks noGrp="1"/>
+          </p:cNvSpPr>
+          <p:nvPr>
+            <p:ph type="title"/>
+          </p:nvPr>
+        </p:nvSpPr>
+        <p:spPr/>
+        <p:txBody>
+          <a:bodyPr/>
+          <a:lstStyle/>
+          <a:p>
+            <a:r>
+              <a:rPr lang="fr-FR" dirty="0"/>
+              <a:t>2. Contexte et projets réalisés</a:t>
+            </a:r>
+          </a:p>
+        </p:txBody>
+      </p:sp>
+      <p:sp>
+        <p:nvSpPr>
+          <p:cNvPr id="3" name="Espace réservé du contenu 2">
+            <a:extLst>
+              <a:ext uri="{FF2B5EF4-FFF2-40B4-BE49-F238E27FC236}">
+                <a16:creationId xmlns:a16="http://schemas.microsoft.com/office/drawing/2014/main" id="{6C52BEB1-5357-F445-95E7-817A6D67CE0B}"/>
+              </a:ext>
+            </a:extLst>
+          </p:cNvPr>
+          <p:cNvSpPr>
+            <a:spLocks noGrp="1"/>
+          </p:cNvSpPr>
+          <p:nvPr>
+            <p:ph idx="1"/>
+          </p:nvPr>
+        </p:nvSpPr>
+        <p:spPr/>
+        <p:txBody>
+          <a:bodyPr/>
+          <a:lstStyle/>
+          <a:p>
+            <a:endParaRPr lang="fr-FR"/>
+          </a:p>
+        </p:txBody>
+      </p:sp>
+      <p:cxnSp>
+        <p:nvCxnSpPr>
+          <p:cNvPr id="4" name="Connecteur droit 3">
+            <a:extLst>
+              <a:ext uri="{FF2B5EF4-FFF2-40B4-BE49-F238E27FC236}">
+                <a16:creationId xmlns:a16="http://schemas.microsoft.com/office/drawing/2014/main" id="{832ADF51-F4FA-BD41-A1A4-D406AF1B5266}"/>
+              </a:ext>
+            </a:extLst>
+          </p:cNvPr>
+          <p:cNvCxnSpPr/>
+          <p:nvPr/>
+        </p:nvCxnSpPr>
+        <p:spPr>
+          <a:xfrm>
+            <a:off x="734291" y="1413164"/>
+            <a:ext cx="7781059" cy="0"/>
+          </a:xfrm>
+          <a:prstGeom prst="line">
+            <a:avLst/>
+          </a:prstGeom>
+          <a:ln w="25400">
+            <a:solidFill>
+              <a:schemeClr val="tx1"/>
+            </a:solidFill>
+          </a:ln>
+        </p:spPr>
+        <p:style>
+          <a:lnRef idx="1">
+            <a:schemeClr val="accent1"/>
+          </a:lnRef>
+          <a:fillRef idx="0">
+            <a:schemeClr val="accent1"/>
+          </a:fillRef>
+          <a:effectRef idx="0">
+            <a:schemeClr val="accent1"/>
+          </a:effectRef>
+          <a:fontRef idx="minor">
+            <a:schemeClr val="tx1"/>
+          </a:fontRef>
+        </p:style>
+      </p:cxnSp>
+    </p:spTree>
+    <p:extLst>
+      <p:ext uri="{BB962C8B-B14F-4D97-AF65-F5344CB8AC3E}">
+        <p14:creationId xmlns:p14="http://schemas.microsoft.com/office/powerpoint/2010/main" val="3669624669"/>
+      </p:ext>
+    </p:extLst>
+  </p:cSld>
+  <p:clrMapOvr>
+    <a:masterClrMapping/>
+  </p:clrMapOvr>
+</p:sld>
+</file>
+
+<file path=ppt/slides/slide8.xml><?xml version="1.0" encoding="utf-8"?>
+<p:sld xmlns:a="http://schemas.openxmlformats.org/drawingml/2006/main" xmlns:r="http://schemas.openxmlformats.org/officeDocument/2006/relationships" xmlns:p="http://schemas.openxmlformats.org/presentationml/2006/main">
+  <p:cSld>
+    <p:spTree>
+      <p:nvGrpSpPr>
+        <p:cNvPr id="1" name=""/>
+        <p:cNvGrpSpPr/>
+        <p:nvPr/>
+      </p:nvGrpSpPr>
+      <p:grpSpPr>
+        <a:xfrm>
+          <a:off x="0" y="0"/>
+          <a:ext cx="0" cy="0"/>
+          <a:chOff x="0" y="0"/>
+          <a:chExt cx="0" cy="0"/>
+        </a:xfrm>
+      </p:grpSpPr>
+      <p:sp>
+        <p:nvSpPr>
+          <p:cNvPr id="2" name="Titre 1">
+            <a:extLst>
+              <a:ext uri="{FF2B5EF4-FFF2-40B4-BE49-F238E27FC236}">
+                <a16:creationId xmlns:a16="http://schemas.microsoft.com/office/drawing/2014/main" id="{D48EB765-980C-0441-9C32-E9FB6AB7C594}"/>
+              </a:ext>
+            </a:extLst>
+          </p:cNvPr>
+          <p:cNvSpPr>
+            <a:spLocks noGrp="1"/>
+          </p:cNvSpPr>
+          <p:nvPr>
+            <p:ph type="title"/>
+          </p:nvPr>
+        </p:nvSpPr>
+        <p:spPr>
+          <a:xfrm>
+            <a:off x="0" y="1661136"/>
+            <a:ext cx="9144000" cy="3535728"/>
+          </a:xfrm>
+        </p:spPr>
+        <p:txBody>
+          <a:bodyPr>
+            <a:normAutofit/>
+          </a:bodyPr>
+          <a:lstStyle/>
+          <a:p>
+            <a:pPr algn="ctr"/>
+            <a:r>
+              <a:rPr lang="fr-FR" dirty="0"/>
+              <a:t>3. Projet : Migration et nouvelles fonctionnalités</a:t>
+            </a:r>
+          </a:p>
+        </p:txBody>
+      </p:sp>
+    </p:spTree>
+    <p:extLst>
+      <p:ext uri="{BB962C8B-B14F-4D97-AF65-F5344CB8AC3E}">
+        <p14:creationId xmlns:p14="http://schemas.microsoft.com/office/powerpoint/2010/main" val="1702815673"/>
+      </p:ext>
+    </p:extLst>
+  </p:cSld>
+  <p:clrMapOvr>
+    <a:masterClrMapping/>
+  </p:clrMapOvr>
+</p:sld>
+</file>
+
+<file path=ppt/slides/slide9.xml><?xml version="1.0" encoding="utf-8"?>
+<p:sld xmlns:a="http://schemas.openxmlformats.org/drawingml/2006/main" xmlns:r="http://schemas.openxmlformats.org/officeDocument/2006/relationships" xmlns:p="http://schemas.openxmlformats.org/presentationml/2006/main">
+  <p:cSld>
+    <p:spTree>
+      <p:nvGrpSpPr>
+        <p:cNvPr id="1" name=""/>
+        <p:cNvGrpSpPr/>
+        <p:nvPr/>
+      </p:nvGrpSpPr>
+      <p:grpSpPr>
+        <a:xfrm>
+          <a:off x="0" y="0"/>
+          <a:ext cx="0" cy="0"/>
+          <a:chOff x="0" y="0"/>
+          <a:chExt cx="0" cy="0"/>
+        </a:xfrm>
+      </p:grpSpPr>
+      <p:sp>
+        <p:nvSpPr>
+          <p:cNvPr id="2" name="Titre 1">
+            <a:extLst>
+              <a:ext uri="{FF2B5EF4-FFF2-40B4-BE49-F238E27FC236}">
+                <a16:creationId xmlns:a16="http://schemas.microsoft.com/office/drawing/2014/main" id="{8D663FA1-5D17-6345-9651-98C491E64C3C}"/>
+              </a:ext>
+            </a:extLst>
+          </p:cNvPr>
+          <p:cNvSpPr>
+            <a:spLocks noGrp="1"/>
+          </p:cNvSpPr>
+          <p:nvPr>
+            <p:ph type="title"/>
+          </p:nvPr>
+        </p:nvSpPr>
+        <p:spPr/>
+        <p:txBody>
+          <a:bodyPr/>
+          <a:lstStyle/>
+          <a:p>
+            <a:r>
+              <a:rPr lang="fr-FR" dirty="0"/>
+              <a:t>3.1. Contexte et objectifs</a:t>
+            </a:r>
+          </a:p>
+        </p:txBody>
+      </p:sp>
+      <p:sp>
+        <p:nvSpPr>
+          <p:cNvPr id="3" name="Espace réservé du contenu 2">
+            <a:extLst>
+              <a:ext uri="{FF2B5EF4-FFF2-40B4-BE49-F238E27FC236}">
+                <a16:creationId xmlns:a16="http://schemas.microsoft.com/office/drawing/2014/main" id="{45C8EBF9-4785-7C43-8ACA-44D7DF30F9EB}"/>
+              </a:ext>
+            </a:extLst>
+          </p:cNvPr>
+          <p:cNvSpPr>
+            <a:spLocks noGrp="1"/>
+          </p:cNvSpPr>
+          <p:nvPr>
+            <p:ph idx="1"/>
+          </p:nvPr>
+        </p:nvSpPr>
+        <p:spPr/>
+        <p:txBody>
+          <a:bodyPr/>
+          <a:lstStyle/>
+          <a:p>
+            <a:endParaRPr lang="fr-FR"/>
+          </a:p>
+        </p:txBody>
+      </p:sp>
+      <p:cxnSp>
+        <p:nvCxnSpPr>
+          <p:cNvPr id="4" name="Connecteur droit 3">
+            <a:extLst>
+              <a:ext uri="{FF2B5EF4-FFF2-40B4-BE49-F238E27FC236}">
+                <a16:creationId xmlns:a16="http://schemas.microsoft.com/office/drawing/2014/main" id="{ABAD759D-B78B-5940-8426-ACCE1464AEE4}"/>
+              </a:ext>
+            </a:extLst>
+          </p:cNvPr>
+          <p:cNvCxnSpPr/>
+          <p:nvPr/>
+        </p:nvCxnSpPr>
+        <p:spPr>
+          <a:xfrm>
+            <a:off x="734291" y="1413164"/>
+            <a:ext cx="7781059" cy="0"/>
+          </a:xfrm>
+          <a:prstGeom prst="line">
+            <a:avLst/>
+          </a:prstGeom>
+          <a:ln w="25400">
+            <a:solidFill>
+              <a:schemeClr val="tx1"/>
+            </a:solidFill>
+          </a:ln>
+        </p:spPr>
+        <p:style>
+          <a:lnRef idx="1">
+            <a:schemeClr val="accent1"/>
+          </a:lnRef>
+          <a:fillRef idx="0">
+            <a:schemeClr val="accent1"/>
+          </a:fillRef>
+          <a:effectRef idx="0">
+            <a:schemeClr val="accent1"/>
+          </a:effectRef>
+          <a:fontRef idx="minor">
+            <a:schemeClr val="tx1"/>
+          </a:fontRef>
+        </p:style>
+      </p:cxnSp>
+    </p:spTree>
+    <p:extLst>
+      <p:ext uri="{BB962C8B-B14F-4D97-AF65-F5344CB8AC3E}">
+        <p14:creationId xmlns:p14="http://schemas.microsoft.com/office/powerpoint/2010/main" val="3895811109"/>
       </p:ext>
     </p:extLst>
   </p:cSld>
@@ -3500,4 +6882,299 @@
     </a:ext>
   </a:extLst>
 </a:theme>
+</file>
+
+<file path=ppt/theme/theme2.xml><?xml version="1.0" encoding="utf-8"?>
+<a:theme xmlns:a="http://schemas.openxmlformats.org/drawingml/2006/main" name="Thème Office">
+  <a:themeElements>
+    <a:clrScheme name="Office">
+      <a:dk1>
+        <a:sysClr val="windowText" lastClr="000000"/>
+      </a:dk1>
+      <a:lt1>
+        <a:sysClr val="window" lastClr="FFFFFF"/>
+      </a:lt1>
+      <a:dk2>
+        <a:srgbClr val="44546A"/>
+      </a:dk2>
+      <a:lt2>
+        <a:srgbClr val="E7E6E6"/>
+      </a:lt2>
+      <a:accent1>
+        <a:srgbClr val="4472C4"/>
+      </a:accent1>
+      <a:accent2>
+        <a:srgbClr val="ED7D31"/>
+      </a:accent2>
+      <a:accent3>
+        <a:srgbClr val="A5A5A5"/>
+      </a:accent3>
+      <a:accent4>
+        <a:srgbClr val="FFC000"/>
+      </a:accent4>
+      <a:accent5>
+        <a:srgbClr val="5B9BD5"/>
+      </a:accent5>
+      <a:accent6>
+        <a:srgbClr val="70AD47"/>
+      </a:accent6>
+      <a:hlink>
+        <a:srgbClr val="0563C1"/>
+      </a:hlink>
+      <a:folHlink>
+        <a:srgbClr val="954F72"/>
+      </a:folHlink>
+    </a:clrScheme>
+    <a:fontScheme name="Office">
+      <a:majorFont>
+        <a:latin typeface="Calibri Light" panose="020F0302020204030204"/>
+        <a:ea typeface=""/>
+        <a:cs typeface=""/>
+        <a:font script="Jpan" typeface="游ゴシック Light"/>
+        <a:font script="Hang" typeface="맑은 고딕"/>
+        <a:font script="Hans" typeface="等线 Light"/>
+        <a:font script="Hant" typeface="新細明體"/>
+        <a:font script="Arab" typeface="Times New Roman"/>
+        <a:font script="Hebr" typeface="Times New Roman"/>
+        <a:font script="Thai" typeface="Angsana New"/>
+        <a:font script="Ethi" typeface="Nyala"/>
+        <a:font script="Beng" typeface="Vrinda"/>
+        <a:font script="Gujr" typeface="Shruti"/>
+        <a:font script="Khmr" typeface="MoolBoran"/>
+        <a:font script="Knda" typeface="Tunga"/>
+        <a:font script="Guru" typeface="Raavi"/>
+        <a:font script="Cans" typeface="Euphemia"/>
+        <a:font script="Cher" typeface="Plantagenet Cherokee"/>
+        <a:font script="Yiii" typeface="Microsoft Yi Baiti"/>
+        <a:font script="Tibt" typeface="Microsoft Himalaya"/>
+        <a:font script="Thaa" typeface="MV Boli"/>
+        <a:font script="Deva" typeface="Mangal"/>
+        <a:font script="Telu" typeface="Gautami"/>
+        <a:font script="Taml" typeface="Latha"/>
+        <a:font script="Syrc" typeface="Estrangelo Edessa"/>
+        <a:font script="Orya" typeface="Kalinga"/>
+        <a:font script="Mlym" typeface="Kartika"/>
+        <a:font script="Laoo" typeface="DokChampa"/>
+        <a:font script="Sinh" typeface="Iskoola Pota"/>
+        <a:font script="Mong" typeface="Mongolian Baiti"/>
+        <a:font script="Viet" typeface="Times New Roman"/>
+        <a:font script="Uigh" typeface="Microsoft Uighur"/>
+        <a:font script="Geor" typeface="Sylfaen"/>
+        <a:font script="Armn" typeface="Arial"/>
+        <a:font script="Bugi" typeface="Leelawadee UI"/>
+        <a:font script="Bopo" typeface="Microsoft JhengHei"/>
+        <a:font script="Java" typeface="Javanese Text"/>
+        <a:font script="Lisu" typeface="Segoe UI"/>
+        <a:font script="Mymr" typeface="Myanmar Text"/>
+        <a:font script="Nkoo" typeface="Ebrima"/>
+        <a:font script="Olck" typeface="Nirmala UI"/>
+        <a:font script="Osma" typeface="Ebrima"/>
+        <a:font script="Phag" typeface="Phagspa"/>
+        <a:font script="Syrn" typeface="Estrangelo Edessa"/>
+        <a:font script="Syrj" typeface="Estrangelo Edessa"/>
+        <a:font script="Syre" typeface="Estrangelo Edessa"/>
+        <a:font script="Sora" typeface="Nirmala UI"/>
+        <a:font script="Tale" typeface="Microsoft Tai Le"/>
+        <a:font script="Talu" typeface="Microsoft New Tai Lue"/>
+        <a:font script="Tfng" typeface="Ebrima"/>
+      </a:majorFont>
+      <a:minorFont>
+        <a:latin typeface="Calibri" panose="020F0502020204030204"/>
+        <a:ea typeface=""/>
+        <a:cs typeface=""/>
+        <a:font script="Jpan" typeface="游ゴシック"/>
+        <a:font script="Hang" typeface="맑은 고딕"/>
+        <a:font script="Hans" typeface="等线"/>
+        <a:font script="Hant" typeface="新細明體"/>
+        <a:font script="Arab" typeface="Arial"/>
+        <a:font script="Hebr" typeface="Arial"/>
+        <a:font script="Thai" typeface="Cordia New"/>
+        <a:font script="Ethi" typeface="Nyala"/>
+        <a:font script="Beng" typeface="Vrinda"/>
+        <a:font script="Gujr" typeface="Shruti"/>
+        <a:font script="Khmr" typeface="DaunPenh"/>
+        <a:font script="Knda" typeface="Tunga"/>
+        <a:font script="Guru" typeface="Raavi"/>
+        <a:font script="Cans" typeface="Euphemia"/>
+        <a:font script="Cher" typeface="Plantagenet Cherokee"/>
+        <a:font script="Yiii" typeface="Microsoft Yi Baiti"/>
+        <a:font script="Tibt" typeface="Microsoft Himalaya"/>
+        <a:font script="Thaa" typeface="MV Boli"/>
+        <a:font script="Deva" typeface="Mangal"/>
+        <a:font script="Telu" typeface="Gautami"/>
+        <a:font script="Taml" typeface="Latha"/>
+        <a:font script="Syrc" typeface="Estrangelo Edessa"/>
+        <a:font script="Orya" typeface="Kalinga"/>
+        <a:font script="Mlym" typeface="Kartika"/>
+        <a:font script="Laoo" typeface="DokChampa"/>
+        <a:font script="Sinh" typeface="Iskoola Pota"/>
+        <a:font script="Mong" typeface="Mongolian Baiti"/>
+        <a:font script="Viet" typeface="Arial"/>
+        <a:font script="Uigh" typeface="Microsoft Uighur"/>
+        <a:font script="Geor" typeface="Sylfaen"/>
+        <a:font script="Armn" typeface="Arial"/>
+        <a:font script="Bugi" typeface="Leelawadee UI"/>
+        <a:font script="Bopo" typeface="Microsoft JhengHei"/>
+        <a:font script="Java" typeface="Javanese Text"/>
+        <a:font script="Lisu" typeface="Segoe UI"/>
+        <a:font script="Mymr" typeface="Myanmar Text"/>
+        <a:font script="Nkoo" typeface="Ebrima"/>
+        <a:font script="Olck" typeface="Nirmala UI"/>
+        <a:font script="Osma" typeface="Ebrima"/>
+        <a:font script="Phag" typeface="Phagspa"/>
+        <a:font script="Syrn" typeface="Estrangelo Edessa"/>
+        <a:font script="Syrj" typeface="Estrangelo Edessa"/>
+        <a:font script="Syre" typeface="Estrangelo Edessa"/>
+        <a:font script="Sora" typeface="Nirmala UI"/>
+        <a:font script="Tale" typeface="Microsoft Tai Le"/>
+        <a:font script="Talu" typeface="Microsoft New Tai Lue"/>
+        <a:font script="Tfng" typeface="Ebrima"/>
+      </a:minorFont>
+    </a:fontScheme>
+    <a:fmtScheme name="Office">
+      <a:fillStyleLst>
+        <a:solidFill>
+          <a:schemeClr val="phClr"/>
+        </a:solidFill>
+        <a:gradFill rotWithShape="1">
+          <a:gsLst>
+            <a:gs pos="0">
+              <a:schemeClr val="phClr">
+                <a:lumMod val="110000"/>
+                <a:satMod val="105000"/>
+                <a:tint val="67000"/>
+              </a:schemeClr>
+            </a:gs>
+            <a:gs pos="50000">
+              <a:schemeClr val="phClr">
+                <a:lumMod val="105000"/>
+                <a:satMod val="103000"/>
+                <a:tint val="73000"/>
+              </a:schemeClr>
+            </a:gs>
+            <a:gs pos="100000">
+              <a:schemeClr val="phClr">
+                <a:lumMod val="105000"/>
+                <a:satMod val="109000"/>
+                <a:tint val="81000"/>
+              </a:schemeClr>
+            </a:gs>
+          </a:gsLst>
+          <a:lin ang="5400000" scaled="0"/>
+        </a:gradFill>
+        <a:gradFill rotWithShape="1">
+          <a:gsLst>
+            <a:gs pos="0">
+              <a:schemeClr val="phClr">
+                <a:satMod val="103000"/>
+                <a:lumMod val="102000"/>
+                <a:tint val="94000"/>
+              </a:schemeClr>
+            </a:gs>
+            <a:gs pos="50000">
+              <a:schemeClr val="phClr">
+                <a:satMod val="110000"/>
+                <a:lumMod val="100000"/>
+                <a:shade val="100000"/>
+              </a:schemeClr>
+            </a:gs>
+            <a:gs pos="100000">
+              <a:schemeClr val="phClr">
+                <a:lumMod val="99000"/>
+                <a:satMod val="120000"/>
+                <a:shade val="78000"/>
+              </a:schemeClr>
+            </a:gs>
+          </a:gsLst>
+          <a:lin ang="5400000" scaled="0"/>
+        </a:gradFill>
+      </a:fillStyleLst>
+      <a:lnStyleLst>
+        <a:ln w="6350" cap="flat" cmpd="sng" algn="ctr">
+          <a:solidFill>
+            <a:schemeClr val="phClr"/>
+          </a:solidFill>
+          <a:prstDash val="solid"/>
+          <a:miter lim="800000"/>
+        </a:ln>
+        <a:ln w="12700" cap="flat" cmpd="sng" algn="ctr">
+          <a:solidFill>
+            <a:schemeClr val="phClr"/>
+          </a:solidFill>
+          <a:prstDash val="solid"/>
+          <a:miter lim="800000"/>
+        </a:ln>
+        <a:ln w="19050" cap="flat" cmpd="sng" algn="ctr">
+          <a:solidFill>
+            <a:schemeClr val="phClr"/>
+          </a:solidFill>
+          <a:prstDash val="solid"/>
+          <a:miter lim="800000"/>
+        </a:ln>
+      </a:lnStyleLst>
+      <a:effectStyleLst>
+        <a:effectStyle>
+          <a:effectLst/>
+        </a:effectStyle>
+        <a:effectStyle>
+          <a:effectLst/>
+        </a:effectStyle>
+        <a:effectStyle>
+          <a:effectLst>
+            <a:outerShdw blurRad="57150" dist="19050" dir="5400000" algn="ctr" rotWithShape="0">
+              <a:srgbClr val="000000">
+                <a:alpha val="63000"/>
+              </a:srgbClr>
+            </a:outerShdw>
+          </a:effectLst>
+        </a:effectStyle>
+      </a:effectStyleLst>
+      <a:bgFillStyleLst>
+        <a:solidFill>
+          <a:schemeClr val="phClr"/>
+        </a:solidFill>
+        <a:solidFill>
+          <a:schemeClr val="phClr">
+            <a:tint val="95000"/>
+            <a:satMod val="170000"/>
+          </a:schemeClr>
+        </a:solidFill>
+        <a:gradFill rotWithShape="1">
+          <a:gsLst>
+            <a:gs pos="0">
+              <a:schemeClr val="phClr">
+                <a:tint val="93000"/>
+                <a:satMod val="150000"/>
+                <a:shade val="98000"/>
+                <a:lumMod val="102000"/>
+              </a:schemeClr>
+            </a:gs>
+            <a:gs pos="50000">
+              <a:schemeClr val="phClr">
+                <a:tint val="98000"/>
+                <a:satMod val="130000"/>
+                <a:shade val="90000"/>
+                <a:lumMod val="103000"/>
+              </a:schemeClr>
+            </a:gs>
+            <a:gs pos="100000">
+              <a:schemeClr val="phClr">
+                <a:shade val="63000"/>
+                <a:satMod val="120000"/>
+              </a:schemeClr>
+            </a:gs>
+          </a:gsLst>
+          <a:lin ang="5400000" scaled="0"/>
+        </a:gradFill>
+      </a:bgFillStyleLst>
+    </a:fmtScheme>
+  </a:themeElements>
+  <a:objectDefaults/>
+  <a:extraClrSchemeLst/>
+  <a:extLst>
+    <a:ext uri="{05A4C25C-085E-4340-85A3-A5531E510DB2}">
+      <thm15:themeFamily xmlns:thm15="http://schemas.microsoft.com/office/thememl/2012/main" name="Office Theme" id="{62F939B6-93AF-4DB8-9C6B-D6C7DFDC589F}" vid="{4A3C46E8-61CC-4603-A589-7422A47A8E4A}"/>
+    </a:ext>
+  </a:extLst>
+</a:theme>
 </file>
</xml_diff>